<commit_message>
more presentation changes in final_presentation
</commit_message>
<xml_diff>
--- a/powerpoint_slides/final_presentation_av.pptx
+++ b/powerpoint_slides/final_presentation_av.pptx
@@ -13,7 +13,8 @@
     <p:sldId id="267" r:id="rId7"/>
     <p:sldId id="268" r:id="rId8"/>
     <p:sldId id="269" r:id="rId9"/>
-    <p:sldId id="270" r:id="rId10"/>
+    <p:sldId id="271" r:id="rId10"/>
+    <p:sldId id="258" r:id="rId11"/>
   </p:sldIdLst>
   <p:sldSz cx="12192000" cy="6858000"/>
   <p:notesSz cx="6858000" cy="9144000"/>
@@ -3768,6 +3769,130 @@
 </p:sld>
 </file>
 
+<file path=ppt/slides/slide10.xml><?xml version="1.0" encoding="utf-8"?>
+<p:sld xmlns:a="http://schemas.openxmlformats.org/drawingml/2006/main" xmlns:r="http://schemas.openxmlformats.org/officeDocument/2006/relationships" xmlns:p="http://schemas.openxmlformats.org/presentationml/2006/main">
+  <p:cSld>
+    <p:spTree>
+      <p:nvGrpSpPr>
+        <p:cNvPr id="1" name=""/>
+        <p:cNvGrpSpPr/>
+        <p:nvPr/>
+      </p:nvGrpSpPr>
+      <p:grpSpPr>
+        <a:xfrm>
+          <a:off x="0" y="0"/>
+          <a:ext cx="0" cy="0"/>
+          <a:chOff x="0" y="0"/>
+          <a:chExt cx="0" cy="0"/>
+        </a:xfrm>
+      </p:grpSpPr>
+      <p:sp>
+        <p:nvSpPr>
+          <p:cNvPr id="2" name="Title 1">
+            <a:extLst>
+              <a:ext uri="{FF2B5EF4-FFF2-40B4-BE49-F238E27FC236}">
+                <a16:creationId xmlns:a16="http://schemas.microsoft.com/office/drawing/2014/main" id="{D6E9D346-95D7-5033-17DA-66AFABEE2C49}"/>
+              </a:ext>
+            </a:extLst>
+          </p:cNvPr>
+          <p:cNvSpPr>
+            <a:spLocks noGrp="1"/>
+          </p:cNvSpPr>
+          <p:nvPr>
+            <p:ph type="title"/>
+          </p:nvPr>
+        </p:nvSpPr>
+        <p:spPr/>
+        <p:txBody>
+          <a:bodyPr/>
+          <a:lstStyle/>
+          <a:p>
+            <a:r>
+              <a:rPr lang="en-US" dirty="0"/>
+              <a:t>Future work</a:t>
+            </a:r>
+          </a:p>
+        </p:txBody>
+      </p:sp>
+      <p:sp>
+        <p:nvSpPr>
+          <p:cNvPr id="3" name="Content Placeholder 2">
+            <a:extLst>
+              <a:ext uri="{FF2B5EF4-FFF2-40B4-BE49-F238E27FC236}">
+                <a16:creationId xmlns:a16="http://schemas.microsoft.com/office/drawing/2014/main" id="{D92D02CF-A62C-5229-0800-D5281038E040}"/>
+              </a:ext>
+            </a:extLst>
+          </p:cNvPr>
+          <p:cNvSpPr>
+            <a:spLocks noGrp="1"/>
+          </p:cNvSpPr>
+          <p:nvPr>
+            <p:ph idx="1"/>
+          </p:nvPr>
+        </p:nvSpPr>
+        <p:spPr/>
+        <p:txBody>
+          <a:bodyPr/>
+          <a:lstStyle/>
+          <a:p>
+            <a:r>
+              <a:rPr lang="en-US" dirty="0"/>
+              <a:t>Feature engineering to address the units-consistency problem</a:t>
+            </a:r>
+          </a:p>
+          <a:p>
+            <a:r>
+              <a:rPr lang="en-US" dirty="0"/>
+              <a:t>Apply workflow on stoichiometries beyond AB</a:t>
+            </a:r>
+            <a:r>
+              <a:rPr lang="en-US" baseline="-25000" dirty="0"/>
+              <a:t>2</a:t>
+            </a:r>
+          </a:p>
+          <a:p>
+            <a:pPr lvl="1"/>
+            <a:r>
+              <a:rPr lang="en-US" dirty="0"/>
+              <a:t>Investigate other classes in AB</a:t>
+            </a:r>
+            <a:r>
+              <a:rPr lang="en-US" baseline="-25000" dirty="0"/>
+              <a:t>2</a:t>
+            </a:r>
+            <a:endParaRPr lang="en-US" dirty="0"/>
+          </a:p>
+          <a:p>
+            <a:r>
+              <a:rPr lang="en-US" dirty="0"/>
+              <a:t>Identify common important features between various expressions</a:t>
+            </a:r>
+          </a:p>
+          <a:p>
+            <a:pPr lvl="1"/>
+            <a:r>
+              <a:rPr lang="en-US" dirty="0"/>
+              <a:t>Expression similarity metrics (tree representation)</a:t>
+            </a:r>
+          </a:p>
+          <a:p>
+            <a:endParaRPr lang="en-US" dirty="0"/>
+          </a:p>
+        </p:txBody>
+      </p:sp>
+    </p:spTree>
+    <p:extLst>
+      <p:ext uri="{BB962C8B-B14F-4D97-AF65-F5344CB8AC3E}">
+        <p14:creationId xmlns:p14="http://schemas.microsoft.com/office/powerpoint/2010/main" val="2489442368"/>
+      </p:ext>
+    </p:extLst>
+  </p:cSld>
+  <p:clrMapOvr>
+    <a:masterClrMapping/>
+  </p:clrMapOvr>
+</p:sld>
+</file>
+
 <file path=ppt/slides/slide2.xml><?xml version="1.0" encoding="utf-8"?>
 <p:sld xmlns:a="http://schemas.openxmlformats.org/drawingml/2006/main" xmlns:r="http://schemas.openxmlformats.org/officeDocument/2006/relationships" xmlns:p="http://schemas.openxmlformats.org/presentationml/2006/main">
   <p:cSld>
@@ -5982,7 +6107,7 @@
           <p:cNvPr id="2" name="Title 1">
             <a:extLst>
               <a:ext uri="{FF2B5EF4-FFF2-40B4-BE49-F238E27FC236}">
-                <a16:creationId xmlns:a16="http://schemas.microsoft.com/office/drawing/2014/main" id="{79745B7E-8B90-2532-E6C9-F8D2EC609B88}"/>
+                <a16:creationId xmlns:a16="http://schemas.microsoft.com/office/drawing/2014/main" id="{76588E93-4E50-B558-E405-9BADC7C61E45}"/>
               </a:ext>
             </a:extLst>
           </p:cNvPr>
@@ -5998,7 +6123,10 @@
           <a:bodyPr/>
           <a:lstStyle/>
           <a:p>
-            <a:endParaRPr lang="en-US" dirty="0"/>
+            <a:r>
+              <a:rPr lang="en-US" dirty="0"/>
+              <a:t>Impact (upon project completion)</a:t>
+            </a:r>
           </a:p>
         </p:txBody>
       </p:sp>
@@ -6007,7 +6135,7 @@
           <p:cNvPr id="3" name="Content Placeholder 2">
             <a:extLst>
               <a:ext uri="{FF2B5EF4-FFF2-40B4-BE49-F238E27FC236}">
-                <a16:creationId xmlns:a16="http://schemas.microsoft.com/office/drawing/2014/main" id="{98201303-2D40-4EA5-8011-E93A0C574EF6}"/>
+                <a16:creationId xmlns:a16="http://schemas.microsoft.com/office/drawing/2014/main" id="{1E61676F-9E12-3A3F-B564-269D72D580FC}"/>
               </a:ext>
             </a:extLst>
           </p:cNvPr>
@@ -6020,17 +6148,58 @@
         </p:nvSpPr>
         <p:spPr/>
         <p:txBody>
-          <a:bodyPr/>
+          <a:bodyPr>
+            <a:normAutofit/>
+          </a:bodyPr>
           <a:lstStyle/>
           <a:p>
-            <a:endParaRPr lang="en-US"/>
+            <a:r>
+              <a:rPr lang="en-US" sz="2800" dirty="0"/>
+              <a:t>Data-driven tolerance factor:</a:t>
+            </a:r>
+          </a:p>
+          <a:p>
+            <a:pPr lvl="1"/>
+            <a:r>
+              <a:rPr lang="en-US" sz="2800" dirty="0"/>
+              <a:t>Replicable workflow</a:t>
+            </a:r>
+          </a:p>
+          <a:p>
+            <a:pPr lvl="1"/>
+            <a:r>
+              <a:rPr lang="en-US" sz="2800" dirty="0"/>
+              <a:t>Simple to use and interpretable (plug and play)</a:t>
+            </a:r>
+          </a:p>
+          <a:p>
+            <a:r>
+              <a:rPr lang="en-US" sz="2800" dirty="0"/>
+              <a:t>Identify features important for prototype classification</a:t>
+            </a:r>
+          </a:p>
+          <a:p>
+            <a:pPr lvl="1"/>
+            <a:r>
+              <a:rPr lang="en-US" sz="2600" dirty="0"/>
+              <a:t>Small list due to symbolic regression simplicity</a:t>
+            </a:r>
+          </a:p>
+          <a:p>
+            <a:endParaRPr lang="en-US" sz="2800" dirty="0"/>
+          </a:p>
+          <a:p>
+            <a:pPr marL="0" indent="0">
+              <a:buNone/>
+            </a:pPr>
+            <a:endParaRPr lang="en-US" sz="2800" dirty="0"/>
           </a:p>
         </p:txBody>
       </p:sp>
     </p:spTree>
     <p:extLst>
       <p:ext uri="{BB962C8B-B14F-4D97-AF65-F5344CB8AC3E}">
-        <p14:creationId xmlns:p14="http://schemas.microsoft.com/office/powerpoint/2010/main" val="2065799261"/>
+        <p14:creationId xmlns:p14="http://schemas.microsoft.com/office/powerpoint/2010/main" val="717126368"/>
       </p:ext>
     </p:extLst>
   </p:cSld>

</xml_diff>

<commit_message>
include fluorite in ppt, other tweaks
</commit_message>
<xml_diff>
--- a/powerpoint_slides/final_presentation_av.pptx
+++ b/powerpoint_slides/final_presentation_av.pptx
@@ -13,8 +13,9 @@
     <p:sldId id="268" r:id="rId7"/>
     <p:sldId id="267" r:id="rId8"/>
     <p:sldId id="269" r:id="rId9"/>
-    <p:sldId id="271" r:id="rId10"/>
-    <p:sldId id="258" r:id="rId11"/>
+    <p:sldId id="272" r:id="rId10"/>
+    <p:sldId id="271" r:id="rId11"/>
+    <p:sldId id="258" r:id="rId12"/>
   </p:sldIdLst>
   <p:sldSz cx="12192000" cy="6858000"/>
   <p:notesSz cx="6858000" cy="9144000"/>
@@ -114,6 +115,25 @@
     </a:lvl9pPr>
   </p:defaultTextStyle>
   <p:extLst>
+    <p:ext uri="{521415D9-36F7-43E2-AB2F-B90AF26B5E84}">
+      <p14:sectionLst xmlns:p14="http://schemas.microsoft.com/office/powerpoint/2010/main">
+        <p14:section name="Default Section" id="{CA0636E8-ACA1-4F0B-A0E4-D0605FFA13B8}">
+          <p14:sldIdLst>
+            <p14:sldId id="256"/>
+            <p14:sldId id="257"/>
+            <p14:sldId id="264"/>
+            <p14:sldId id="265"/>
+            <p14:sldId id="266"/>
+            <p14:sldId id="268"/>
+            <p14:sldId id="267"/>
+            <p14:sldId id="269"/>
+            <p14:sldId id="272"/>
+            <p14:sldId id="271"/>
+            <p14:sldId id="258"/>
+          </p14:sldIdLst>
+        </p14:section>
+      </p14:sectionLst>
+    </p:ext>
     <p:ext uri="{EFAFB233-063F-42B5-8137-9DF3F51BA10A}">
       <p15:sldGuideLst xmlns:p15="http://schemas.microsoft.com/office/powerpoint/2012/main"/>
     </p:ext>
@@ -3791,6 +3811,371 @@
           <p:cNvPr id="2" name="Title 1">
             <a:extLst>
               <a:ext uri="{FF2B5EF4-FFF2-40B4-BE49-F238E27FC236}">
+                <a16:creationId xmlns:a16="http://schemas.microsoft.com/office/drawing/2014/main" id="{76588E93-4E50-B558-E405-9BADC7C61E45}"/>
+              </a:ext>
+            </a:extLst>
+          </p:cNvPr>
+          <p:cNvSpPr>
+            <a:spLocks noGrp="1"/>
+          </p:cNvSpPr>
+          <p:nvPr>
+            <p:ph type="title"/>
+          </p:nvPr>
+        </p:nvSpPr>
+        <p:spPr/>
+        <p:txBody>
+          <a:bodyPr/>
+          <a:lstStyle/>
+          <a:p>
+            <a:r>
+              <a:rPr lang="en-US" dirty="0"/>
+              <a:t>Impact (if successful)</a:t>
+            </a:r>
+          </a:p>
+        </p:txBody>
+      </p:sp>
+      <p:sp>
+        <p:nvSpPr>
+          <p:cNvPr id="3" name="Content Placeholder 2">
+            <a:extLst>
+              <a:ext uri="{FF2B5EF4-FFF2-40B4-BE49-F238E27FC236}">
+                <a16:creationId xmlns:a16="http://schemas.microsoft.com/office/drawing/2014/main" id="{1E61676F-9E12-3A3F-B564-269D72D580FC}"/>
+              </a:ext>
+            </a:extLst>
+          </p:cNvPr>
+          <p:cNvSpPr>
+            <a:spLocks noGrp="1"/>
+          </p:cNvSpPr>
+          <p:nvPr>
+            <p:ph idx="1"/>
+          </p:nvPr>
+        </p:nvSpPr>
+        <p:spPr/>
+        <p:txBody>
+          <a:bodyPr>
+            <a:normAutofit/>
+          </a:bodyPr>
+          <a:lstStyle/>
+          <a:p>
+            <a:r>
+              <a:rPr lang="en-US" sz="2800" dirty="0"/>
+              <a:t>Formulate a data-driven tolerance factor:</a:t>
+            </a:r>
+          </a:p>
+          <a:p>
+            <a:pPr lvl="1"/>
+            <a:r>
+              <a:rPr lang="en-US" sz="2800" dirty="0"/>
+              <a:t>using a repeatable workflow</a:t>
+            </a:r>
+          </a:p>
+          <a:p>
+            <a:pPr lvl="1"/>
+            <a:r>
+              <a:rPr lang="en-US" sz="2800" dirty="0"/>
+              <a:t>that is simple to use and interpretable</a:t>
+            </a:r>
+          </a:p>
+          <a:p>
+            <a:r>
+              <a:rPr lang="en-US" sz="2800" dirty="0"/>
+              <a:t>Identify new features important for prototype classification</a:t>
+            </a:r>
+          </a:p>
+          <a:p>
+            <a:r>
+              <a:rPr lang="en-US" sz="2800" dirty="0"/>
+              <a:t>Create design rules for novel materials discovery</a:t>
+            </a:r>
+          </a:p>
+          <a:p>
+            <a:endParaRPr lang="en-US" sz="2800" dirty="0"/>
+          </a:p>
+          <a:p>
+            <a:pPr marL="0" indent="0">
+              <a:buNone/>
+            </a:pPr>
+            <a:endParaRPr lang="en-US" sz="2800" dirty="0"/>
+          </a:p>
+        </p:txBody>
+      </p:sp>
+    </p:spTree>
+    <p:extLst>
+      <p:ext uri="{BB962C8B-B14F-4D97-AF65-F5344CB8AC3E}">
+        <p14:creationId xmlns:p14="http://schemas.microsoft.com/office/powerpoint/2010/main" val="717126368"/>
+      </p:ext>
+    </p:extLst>
+  </p:cSld>
+  <p:clrMapOvr>
+    <a:masterClrMapping/>
+  </p:clrMapOvr>
+  <p:timing>
+    <p:tnLst>
+      <p:par>
+        <p:cTn id="1" dur="indefinite" restart="never" nodeType="tmRoot">
+          <p:childTnLst>
+            <p:seq concurrent="1" nextAc="seek">
+              <p:cTn id="2" dur="indefinite" nodeType="mainSeq">
+                <p:childTnLst>
+                  <p:par>
+                    <p:cTn id="3" fill="hold">
+                      <p:stCondLst>
+                        <p:cond delay="indefinite"/>
+                      </p:stCondLst>
+                      <p:childTnLst>
+                        <p:par>
+                          <p:cTn id="4" fill="hold">
+                            <p:stCondLst>
+                              <p:cond delay="0"/>
+                            </p:stCondLst>
+                            <p:childTnLst>
+                              <p:par>
+                                <p:cTn id="5" presetID="1" presetClass="entr" presetSubtype="0" fill="hold" grpId="0" nodeType="clickEffect">
+                                  <p:stCondLst>
+                                    <p:cond delay="0"/>
+                                  </p:stCondLst>
+                                  <p:childTnLst>
+                                    <p:set>
+                                      <p:cBhvr>
+                                        <p:cTn id="6" dur="1" fill="hold">
+                                          <p:stCondLst>
+                                            <p:cond delay="0"/>
+                                          </p:stCondLst>
+                                        </p:cTn>
+                                        <p:tgtEl>
+                                          <p:spTgt spid="3">
+                                            <p:txEl>
+                                              <p:pRg st="0" end="0"/>
+                                            </p:txEl>
+                                          </p:spTgt>
+                                        </p:tgtEl>
+                                        <p:attrNameLst>
+                                          <p:attrName>style.visibility</p:attrName>
+                                        </p:attrNameLst>
+                                      </p:cBhvr>
+                                      <p:to>
+                                        <p:strVal val="visible"/>
+                                      </p:to>
+                                    </p:set>
+                                  </p:childTnLst>
+                                </p:cTn>
+                              </p:par>
+                              <p:par>
+                                <p:cTn id="7" presetID="1" presetClass="entr" presetSubtype="0" fill="hold" grpId="0" nodeType="withEffect">
+                                  <p:stCondLst>
+                                    <p:cond delay="0"/>
+                                  </p:stCondLst>
+                                  <p:childTnLst>
+                                    <p:set>
+                                      <p:cBhvr>
+                                        <p:cTn id="8" dur="1" fill="hold">
+                                          <p:stCondLst>
+                                            <p:cond delay="0"/>
+                                          </p:stCondLst>
+                                        </p:cTn>
+                                        <p:tgtEl>
+                                          <p:spTgt spid="3">
+                                            <p:txEl>
+                                              <p:pRg st="1" end="1"/>
+                                            </p:txEl>
+                                          </p:spTgt>
+                                        </p:tgtEl>
+                                        <p:attrNameLst>
+                                          <p:attrName>style.visibility</p:attrName>
+                                        </p:attrNameLst>
+                                      </p:cBhvr>
+                                      <p:to>
+                                        <p:strVal val="visible"/>
+                                      </p:to>
+                                    </p:set>
+                                  </p:childTnLst>
+                                </p:cTn>
+                              </p:par>
+                              <p:par>
+                                <p:cTn id="9" presetID="1" presetClass="entr" presetSubtype="0" fill="hold" grpId="0" nodeType="withEffect">
+                                  <p:stCondLst>
+                                    <p:cond delay="0"/>
+                                  </p:stCondLst>
+                                  <p:childTnLst>
+                                    <p:set>
+                                      <p:cBhvr>
+                                        <p:cTn id="10" dur="1" fill="hold">
+                                          <p:stCondLst>
+                                            <p:cond delay="0"/>
+                                          </p:stCondLst>
+                                        </p:cTn>
+                                        <p:tgtEl>
+                                          <p:spTgt spid="3">
+                                            <p:txEl>
+                                              <p:pRg st="2" end="2"/>
+                                            </p:txEl>
+                                          </p:spTgt>
+                                        </p:tgtEl>
+                                        <p:attrNameLst>
+                                          <p:attrName>style.visibility</p:attrName>
+                                        </p:attrNameLst>
+                                      </p:cBhvr>
+                                      <p:to>
+                                        <p:strVal val="visible"/>
+                                      </p:to>
+                                    </p:set>
+                                  </p:childTnLst>
+                                </p:cTn>
+                              </p:par>
+                            </p:childTnLst>
+                          </p:cTn>
+                        </p:par>
+                      </p:childTnLst>
+                    </p:cTn>
+                  </p:par>
+                  <p:par>
+                    <p:cTn id="11" fill="hold">
+                      <p:stCondLst>
+                        <p:cond delay="indefinite"/>
+                      </p:stCondLst>
+                      <p:childTnLst>
+                        <p:par>
+                          <p:cTn id="12" fill="hold">
+                            <p:stCondLst>
+                              <p:cond delay="0"/>
+                            </p:stCondLst>
+                            <p:childTnLst>
+                              <p:par>
+                                <p:cTn id="13" presetID="1" presetClass="entr" presetSubtype="0" fill="hold" grpId="0" nodeType="clickEffect">
+                                  <p:stCondLst>
+                                    <p:cond delay="0"/>
+                                  </p:stCondLst>
+                                  <p:childTnLst>
+                                    <p:set>
+                                      <p:cBhvr>
+                                        <p:cTn id="14" dur="1" fill="hold">
+                                          <p:stCondLst>
+                                            <p:cond delay="0"/>
+                                          </p:stCondLst>
+                                        </p:cTn>
+                                        <p:tgtEl>
+                                          <p:spTgt spid="3">
+                                            <p:txEl>
+                                              <p:pRg st="3" end="3"/>
+                                            </p:txEl>
+                                          </p:spTgt>
+                                        </p:tgtEl>
+                                        <p:attrNameLst>
+                                          <p:attrName>style.visibility</p:attrName>
+                                        </p:attrNameLst>
+                                      </p:cBhvr>
+                                      <p:to>
+                                        <p:strVal val="visible"/>
+                                      </p:to>
+                                    </p:set>
+                                  </p:childTnLst>
+                                </p:cTn>
+                              </p:par>
+                            </p:childTnLst>
+                          </p:cTn>
+                        </p:par>
+                      </p:childTnLst>
+                    </p:cTn>
+                  </p:par>
+                  <p:par>
+                    <p:cTn id="15" fill="hold">
+                      <p:stCondLst>
+                        <p:cond delay="indefinite"/>
+                      </p:stCondLst>
+                      <p:childTnLst>
+                        <p:par>
+                          <p:cTn id="16" fill="hold">
+                            <p:stCondLst>
+                              <p:cond delay="0"/>
+                            </p:stCondLst>
+                            <p:childTnLst>
+                              <p:par>
+                                <p:cTn id="17" presetID="1" presetClass="entr" presetSubtype="0" fill="hold" grpId="0" nodeType="clickEffect">
+                                  <p:stCondLst>
+                                    <p:cond delay="0"/>
+                                  </p:stCondLst>
+                                  <p:childTnLst>
+                                    <p:set>
+                                      <p:cBhvr>
+                                        <p:cTn id="18" dur="1" fill="hold">
+                                          <p:stCondLst>
+                                            <p:cond delay="0"/>
+                                          </p:stCondLst>
+                                        </p:cTn>
+                                        <p:tgtEl>
+                                          <p:spTgt spid="3">
+                                            <p:txEl>
+                                              <p:pRg st="4" end="4"/>
+                                            </p:txEl>
+                                          </p:spTgt>
+                                        </p:tgtEl>
+                                        <p:attrNameLst>
+                                          <p:attrName>style.visibility</p:attrName>
+                                        </p:attrNameLst>
+                                      </p:cBhvr>
+                                      <p:to>
+                                        <p:strVal val="visible"/>
+                                      </p:to>
+                                    </p:set>
+                                  </p:childTnLst>
+                                </p:cTn>
+                              </p:par>
+                            </p:childTnLst>
+                          </p:cTn>
+                        </p:par>
+                      </p:childTnLst>
+                    </p:cTn>
+                  </p:par>
+                </p:childTnLst>
+              </p:cTn>
+              <p:prevCondLst>
+                <p:cond evt="onPrev" delay="0">
+                  <p:tgtEl>
+                    <p:sldTgt/>
+                  </p:tgtEl>
+                </p:cond>
+              </p:prevCondLst>
+              <p:nextCondLst>
+                <p:cond evt="onNext" delay="0">
+                  <p:tgtEl>
+                    <p:sldTgt/>
+                  </p:tgtEl>
+                </p:cond>
+              </p:nextCondLst>
+            </p:seq>
+          </p:childTnLst>
+        </p:cTn>
+      </p:par>
+    </p:tnLst>
+    <p:bldLst>
+      <p:bldP spid="3" grpId="0" build="p"/>
+    </p:bldLst>
+  </p:timing>
+</p:sld>
+</file>
+
+<file path=ppt/slides/slide11.xml><?xml version="1.0" encoding="utf-8"?>
+<p:sld xmlns:a="http://schemas.openxmlformats.org/drawingml/2006/main" xmlns:r="http://schemas.openxmlformats.org/officeDocument/2006/relationships" xmlns:p="http://schemas.openxmlformats.org/presentationml/2006/main">
+  <p:cSld>
+    <p:spTree>
+      <p:nvGrpSpPr>
+        <p:cNvPr id="1" name=""/>
+        <p:cNvGrpSpPr/>
+        <p:nvPr/>
+      </p:nvGrpSpPr>
+      <p:grpSpPr>
+        <a:xfrm>
+          <a:off x="0" y="0"/>
+          <a:ext cx="0" cy="0"/>
+          <a:chOff x="0" y="0"/>
+          <a:chExt cx="0" cy="0"/>
+        </a:xfrm>
+      </p:grpSpPr>
+      <p:sp>
+        <p:nvSpPr>
+          <p:cNvPr id="2" name="Title 1">
+            <a:extLst>
+              <a:ext uri="{FF2B5EF4-FFF2-40B4-BE49-F238E27FC236}">
                 <a16:creationId xmlns:a16="http://schemas.microsoft.com/office/drawing/2014/main" id="{D6E9D346-95D7-5033-17DA-66AFABEE2C49}"/>
               </a:ext>
             </a:extLst>
@@ -3845,18 +4230,45 @@
           <a:p>
             <a:r>
               <a:rPr lang="en-US" sz="2800" dirty="0"/>
+              <a:t>Identify common important features between various expressions</a:t>
+            </a:r>
+          </a:p>
+          <a:p>
+            <a:r>
+              <a:rPr lang="en-US" sz="2800" dirty="0"/>
+              <a:t>Tune symbolic learner</a:t>
+            </a:r>
+          </a:p>
+          <a:p>
+            <a:pPr lvl="1"/>
+            <a:r>
+              <a:rPr lang="en-US" sz="2600" dirty="0"/>
+              <a:t>Output confidence metric (customize </a:t>
+            </a:r>
+            <a:r>
+              <a:rPr lang="en-US" sz="2600" dirty="0" err="1"/>
+              <a:t>prec</a:t>
+            </a:r>
+            <a:r>
+              <a:rPr lang="en-US" sz="2600" dirty="0"/>
+              <a:t>/recall balance)</a:t>
+            </a:r>
+          </a:p>
+          <a:p>
+            <a:pPr lvl="1"/>
+            <a:r>
+              <a:rPr lang="en-US" sz="2600" dirty="0"/>
+              <a:t>Strike balance between accuracy &amp; generality/simplicity</a:t>
+            </a:r>
+          </a:p>
+          <a:p>
+            <a:r>
+              <a:rPr lang="en-US" sz="2800" dirty="0"/>
               <a:t>Apply workflow on stoichiometries beyond AB</a:t>
             </a:r>
             <a:r>
               <a:rPr lang="en-US" sz="2800" baseline="-25000" dirty="0"/>
               <a:t>2</a:t>
-            </a:r>
-            <a:endParaRPr lang="en-US" sz="2800" dirty="0"/>
-          </a:p>
-          <a:p>
-            <a:r>
-              <a:rPr lang="en-US" sz="2800" dirty="0"/>
-              <a:t>Identify common important features between various expressions</a:t>
             </a:r>
           </a:p>
           <a:p>
@@ -3879,7 +4291,18 @@
               </a:rPr>
               <a:t>Tradeoff between generality and interpretability</a:t>
             </a:r>
-            <a:endParaRPr lang="en-US" sz="2600" dirty="0"/>
+          </a:p>
+          <a:p>
+            <a:pPr marL="0" indent="0">
+              <a:buNone/>
+            </a:pPr>
+            <a:endParaRPr lang="en-US" sz="2800" dirty="0"/>
+          </a:p>
+          <a:p>
+            <a:pPr lvl="1"/>
+            <a:endParaRPr lang="en-US" sz="2600" dirty="0">
+              <a:sym typeface="Wingdings" panose="05000000000000000000" pitchFamily="2" charset="2"/>
+            </a:endParaRPr>
           </a:p>
           <a:p>
             <a:endParaRPr lang="en-US" sz="2800" dirty="0"/>
@@ -3896,6 +4319,377 @@
   <p:clrMapOvr>
     <a:masterClrMapping/>
   </p:clrMapOvr>
+  <p:timing>
+    <p:tnLst>
+      <p:par>
+        <p:cTn id="1" dur="indefinite" restart="never" nodeType="tmRoot">
+          <p:childTnLst>
+            <p:seq concurrent="1" nextAc="seek">
+              <p:cTn id="2" dur="indefinite" nodeType="mainSeq">
+                <p:childTnLst>
+                  <p:par>
+                    <p:cTn id="3" fill="hold">
+                      <p:stCondLst>
+                        <p:cond delay="indefinite"/>
+                      </p:stCondLst>
+                      <p:childTnLst>
+                        <p:par>
+                          <p:cTn id="4" fill="hold">
+                            <p:stCondLst>
+                              <p:cond delay="0"/>
+                            </p:stCondLst>
+                            <p:childTnLst>
+                              <p:par>
+                                <p:cTn id="5" presetID="1" presetClass="entr" presetSubtype="0" fill="hold" grpId="0" nodeType="clickEffect">
+                                  <p:stCondLst>
+                                    <p:cond delay="0"/>
+                                  </p:stCondLst>
+                                  <p:childTnLst>
+                                    <p:set>
+                                      <p:cBhvr>
+                                        <p:cTn id="6" dur="1" fill="hold">
+                                          <p:stCondLst>
+                                            <p:cond delay="0"/>
+                                          </p:stCondLst>
+                                        </p:cTn>
+                                        <p:tgtEl>
+                                          <p:spTgt spid="3">
+                                            <p:txEl>
+                                              <p:pRg st="0" end="0"/>
+                                            </p:txEl>
+                                          </p:spTgt>
+                                        </p:tgtEl>
+                                        <p:attrNameLst>
+                                          <p:attrName>style.visibility</p:attrName>
+                                        </p:attrNameLst>
+                                      </p:cBhvr>
+                                      <p:to>
+                                        <p:strVal val="visible"/>
+                                      </p:to>
+                                    </p:set>
+                                  </p:childTnLst>
+                                </p:cTn>
+                              </p:par>
+                            </p:childTnLst>
+                          </p:cTn>
+                        </p:par>
+                      </p:childTnLst>
+                    </p:cTn>
+                  </p:par>
+                  <p:par>
+                    <p:cTn id="7" fill="hold">
+                      <p:stCondLst>
+                        <p:cond delay="indefinite"/>
+                      </p:stCondLst>
+                      <p:childTnLst>
+                        <p:par>
+                          <p:cTn id="8" fill="hold">
+                            <p:stCondLst>
+                              <p:cond delay="0"/>
+                            </p:stCondLst>
+                            <p:childTnLst>
+                              <p:par>
+                                <p:cTn id="9" presetID="1" presetClass="entr" presetSubtype="0" fill="hold" grpId="0" nodeType="clickEffect">
+                                  <p:stCondLst>
+                                    <p:cond delay="0"/>
+                                  </p:stCondLst>
+                                  <p:childTnLst>
+                                    <p:set>
+                                      <p:cBhvr>
+                                        <p:cTn id="10" dur="1" fill="hold">
+                                          <p:stCondLst>
+                                            <p:cond delay="0"/>
+                                          </p:stCondLst>
+                                        </p:cTn>
+                                        <p:tgtEl>
+                                          <p:spTgt spid="3">
+                                            <p:txEl>
+                                              <p:pRg st="1" end="1"/>
+                                            </p:txEl>
+                                          </p:spTgt>
+                                        </p:tgtEl>
+                                        <p:attrNameLst>
+                                          <p:attrName>style.visibility</p:attrName>
+                                        </p:attrNameLst>
+                                      </p:cBhvr>
+                                      <p:to>
+                                        <p:strVal val="visible"/>
+                                      </p:to>
+                                    </p:set>
+                                  </p:childTnLst>
+                                </p:cTn>
+                              </p:par>
+                            </p:childTnLst>
+                          </p:cTn>
+                        </p:par>
+                      </p:childTnLst>
+                    </p:cTn>
+                  </p:par>
+                  <p:par>
+                    <p:cTn id="11" fill="hold">
+                      <p:stCondLst>
+                        <p:cond delay="indefinite"/>
+                      </p:stCondLst>
+                      <p:childTnLst>
+                        <p:par>
+                          <p:cTn id="12" fill="hold">
+                            <p:stCondLst>
+                              <p:cond delay="0"/>
+                            </p:stCondLst>
+                            <p:childTnLst>
+                              <p:par>
+                                <p:cTn id="13" presetID="1" presetClass="entr" presetSubtype="0" fill="hold" grpId="0" nodeType="clickEffect">
+                                  <p:stCondLst>
+                                    <p:cond delay="0"/>
+                                  </p:stCondLst>
+                                  <p:childTnLst>
+                                    <p:set>
+                                      <p:cBhvr>
+                                        <p:cTn id="14" dur="1" fill="hold">
+                                          <p:stCondLst>
+                                            <p:cond delay="0"/>
+                                          </p:stCondLst>
+                                        </p:cTn>
+                                        <p:tgtEl>
+                                          <p:spTgt spid="3">
+                                            <p:txEl>
+                                              <p:pRg st="2" end="2"/>
+                                            </p:txEl>
+                                          </p:spTgt>
+                                        </p:tgtEl>
+                                        <p:attrNameLst>
+                                          <p:attrName>style.visibility</p:attrName>
+                                        </p:attrNameLst>
+                                      </p:cBhvr>
+                                      <p:to>
+                                        <p:strVal val="visible"/>
+                                      </p:to>
+                                    </p:set>
+                                  </p:childTnLst>
+                                </p:cTn>
+                              </p:par>
+                              <p:par>
+                                <p:cTn id="15" presetID="1" presetClass="entr" presetSubtype="0" fill="hold" grpId="0" nodeType="withEffect">
+                                  <p:stCondLst>
+                                    <p:cond delay="0"/>
+                                  </p:stCondLst>
+                                  <p:childTnLst>
+                                    <p:set>
+                                      <p:cBhvr>
+                                        <p:cTn id="16" dur="1" fill="hold">
+                                          <p:stCondLst>
+                                            <p:cond delay="0"/>
+                                          </p:stCondLst>
+                                        </p:cTn>
+                                        <p:tgtEl>
+                                          <p:spTgt spid="3">
+                                            <p:txEl>
+                                              <p:pRg st="3" end="3"/>
+                                            </p:txEl>
+                                          </p:spTgt>
+                                        </p:tgtEl>
+                                        <p:attrNameLst>
+                                          <p:attrName>style.visibility</p:attrName>
+                                        </p:attrNameLst>
+                                      </p:cBhvr>
+                                      <p:to>
+                                        <p:strVal val="visible"/>
+                                      </p:to>
+                                    </p:set>
+                                  </p:childTnLst>
+                                </p:cTn>
+                              </p:par>
+                              <p:par>
+                                <p:cTn id="17" presetID="1" presetClass="entr" presetSubtype="0" fill="hold" grpId="0" nodeType="withEffect">
+                                  <p:stCondLst>
+                                    <p:cond delay="0"/>
+                                  </p:stCondLst>
+                                  <p:childTnLst>
+                                    <p:set>
+                                      <p:cBhvr>
+                                        <p:cTn id="18" dur="1" fill="hold">
+                                          <p:stCondLst>
+                                            <p:cond delay="0"/>
+                                          </p:stCondLst>
+                                        </p:cTn>
+                                        <p:tgtEl>
+                                          <p:spTgt spid="3">
+                                            <p:txEl>
+                                              <p:pRg st="4" end="4"/>
+                                            </p:txEl>
+                                          </p:spTgt>
+                                        </p:tgtEl>
+                                        <p:attrNameLst>
+                                          <p:attrName>style.visibility</p:attrName>
+                                        </p:attrNameLst>
+                                      </p:cBhvr>
+                                      <p:to>
+                                        <p:strVal val="visible"/>
+                                      </p:to>
+                                    </p:set>
+                                  </p:childTnLst>
+                                </p:cTn>
+                              </p:par>
+                            </p:childTnLst>
+                          </p:cTn>
+                        </p:par>
+                      </p:childTnLst>
+                    </p:cTn>
+                  </p:par>
+                  <p:par>
+                    <p:cTn id="19" fill="hold">
+                      <p:stCondLst>
+                        <p:cond delay="indefinite"/>
+                      </p:stCondLst>
+                      <p:childTnLst>
+                        <p:par>
+                          <p:cTn id="20" fill="hold">
+                            <p:stCondLst>
+                              <p:cond delay="0"/>
+                            </p:stCondLst>
+                            <p:childTnLst>
+                              <p:par>
+                                <p:cTn id="21" presetID="1" presetClass="entr" presetSubtype="0" fill="hold" grpId="0" nodeType="clickEffect">
+                                  <p:stCondLst>
+                                    <p:cond delay="0"/>
+                                  </p:stCondLst>
+                                  <p:childTnLst>
+                                    <p:set>
+                                      <p:cBhvr>
+                                        <p:cTn id="22" dur="1" fill="hold">
+                                          <p:stCondLst>
+                                            <p:cond delay="0"/>
+                                          </p:stCondLst>
+                                        </p:cTn>
+                                        <p:tgtEl>
+                                          <p:spTgt spid="3">
+                                            <p:txEl>
+                                              <p:pRg st="5" end="5"/>
+                                            </p:txEl>
+                                          </p:spTgt>
+                                        </p:tgtEl>
+                                        <p:attrNameLst>
+                                          <p:attrName>style.visibility</p:attrName>
+                                        </p:attrNameLst>
+                                      </p:cBhvr>
+                                      <p:to>
+                                        <p:strVal val="visible"/>
+                                      </p:to>
+                                    </p:set>
+                                  </p:childTnLst>
+                                </p:cTn>
+                              </p:par>
+                            </p:childTnLst>
+                          </p:cTn>
+                        </p:par>
+                      </p:childTnLst>
+                    </p:cTn>
+                  </p:par>
+                  <p:par>
+                    <p:cTn id="23" fill="hold">
+                      <p:stCondLst>
+                        <p:cond delay="indefinite"/>
+                      </p:stCondLst>
+                      <p:childTnLst>
+                        <p:par>
+                          <p:cTn id="24" fill="hold">
+                            <p:stCondLst>
+                              <p:cond delay="0"/>
+                            </p:stCondLst>
+                            <p:childTnLst>
+                              <p:par>
+                                <p:cTn id="25" presetID="1" presetClass="entr" presetSubtype="0" fill="hold" grpId="0" nodeType="clickEffect">
+                                  <p:stCondLst>
+                                    <p:cond delay="0"/>
+                                  </p:stCondLst>
+                                  <p:childTnLst>
+                                    <p:set>
+                                      <p:cBhvr>
+                                        <p:cTn id="26" dur="1" fill="hold">
+                                          <p:stCondLst>
+                                            <p:cond delay="0"/>
+                                          </p:stCondLst>
+                                        </p:cTn>
+                                        <p:tgtEl>
+                                          <p:spTgt spid="3">
+                                            <p:txEl>
+                                              <p:pRg st="6" end="6"/>
+                                            </p:txEl>
+                                          </p:spTgt>
+                                        </p:tgtEl>
+                                        <p:attrNameLst>
+                                          <p:attrName>style.visibility</p:attrName>
+                                        </p:attrNameLst>
+                                      </p:cBhvr>
+                                      <p:to>
+                                        <p:strVal val="visible"/>
+                                      </p:to>
+                                    </p:set>
+                                  </p:childTnLst>
+                                </p:cTn>
+                              </p:par>
+                              <p:par>
+                                <p:cTn id="27" presetID="1" presetClass="entr" presetSubtype="0" fill="hold" grpId="0" nodeType="withEffect">
+                                  <p:stCondLst>
+                                    <p:cond delay="0"/>
+                                  </p:stCondLst>
+                                  <p:childTnLst>
+                                    <p:set>
+                                      <p:cBhvr>
+                                        <p:cTn id="28" dur="1" fill="hold">
+                                          <p:stCondLst>
+                                            <p:cond delay="0"/>
+                                          </p:stCondLst>
+                                        </p:cTn>
+                                        <p:tgtEl>
+                                          <p:spTgt spid="3">
+                                            <p:txEl>
+                                              <p:pRg st="7" end="7"/>
+                                            </p:txEl>
+                                          </p:spTgt>
+                                        </p:tgtEl>
+                                        <p:attrNameLst>
+                                          <p:attrName>style.visibility</p:attrName>
+                                        </p:attrNameLst>
+                                      </p:cBhvr>
+                                      <p:to>
+                                        <p:strVal val="visible"/>
+                                      </p:to>
+                                    </p:set>
+                                  </p:childTnLst>
+                                </p:cTn>
+                              </p:par>
+                            </p:childTnLst>
+                          </p:cTn>
+                        </p:par>
+                      </p:childTnLst>
+                    </p:cTn>
+                  </p:par>
+                </p:childTnLst>
+              </p:cTn>
+              <p:prevCondLst>
+                <p:cond evt="onPrev" delay="0">
+                  <p:tgtEl>
+                    <p:sldTgt/>
+                  </p:tgtEl>
+                </p:cond>
+              </p:prevCondLst>
+              <p:nextCondLst>
+                <p:cond evt="onNext" delay="0">
+                  <p:tgtEl>
+                    <p:sldTgt/>
+                  </p:tgtEl>
+                </p:cond>
+              </p:nextCondLst>
+            </p:seq>
+          </p:childTnLst>
+        </p:cTn>
+      </p:par>
+    </p:tnLst>
+    <p:bldLst>
+      <p:bldP spid="3" grpId="0" build="p"/>
+    </p:bldLst>
+  </p:timing>
 </p:sld>
 </file>
 
@@ -4183,6 +4977,279 @@
   <p:clrMapOvr>
     <a:masterClrMapping/>
   </p:clrMapOvr>
+  <p:timing>
+    <p:tnLst>
+      <p:par>
+        <p:cTn id="1" dur="indefinite" restart="never" nodeType="tmRoot">
+          <p:childTnLst>
+            <p:seq concurrent="1" nextAc="seek">
+              <p:cTn id="2" dur="indefinite" nodeType="mainSeq">
+                <p:childTnLst>
+                  <p:par>
+                    <p:cTn id="3" fill="hold">
+                      <p:stCondLst>
+                        <p:cond delay="indefinite"/>
+                      </p:stCondLst>
+                      <p:childTnLst>
+                        <p:par>
+                          <p:cTn id="4" fill="hold">
+                            <p:stCondLst>
+                              <p:cond delay="0"/>
+                            </p:stCondLst>
+                            <p:childTnLst>
+                              <p:par>
+                                <p:cTn id="5" presetID="1" presetClass="entr" presetSubtype="0" fill="hold" grpId="0" nodeType="clickEffect">
+                                  <p:stCondLst>
+                                    <p:cond delay="0"/>
+                                  </p:stCondLst>
+                                  <p:childTnLst>
+                                    <p:set>
+                                      <p:cBhvr>
+                                        <p:cTn id="6" dur="1" fill="hold">
+                                          <p:stCondLst>
+                                            <p:cond delay="0"/>
+                                          </p:stCondLst>
+                                        </p:cTn>
+                                        <p:tgtEl>
+                                          <p:spTgt spid="3">
+                                            <p:txEl>
+                                              <p:pRg st="0" end="0"/>
+                                            </p:txEl>
+                                          </p:spTgt>
+                                        </p:tgtEl>
+                                        <p:attrNameLst>
+                                          <p:attrName>style.visibility</p:attrName>
+                                        </p:attrNameLst>
+                                      </p:cBhvr>
+                                      <p:to>
+                                        <p:strVal val="visible"/>
+                                      </p:to>
+                                    </p:set>
+                                  </p:childTnLst>
+                                </p:cTn>
+                              </p:par>
+                              <p:par>
+                                <p:cTn id="7" presetID="1" presetClass="entr" presetSubtype="0" fill="hold" grpId="0" nodeType="withEffect">
+                                  <p:stCondLst>
+                                    <p:cond delay="0"/>
+                                  </p:stCondLst>
+                                  <p:childTnLst>
+                                    <p:set>
+                                      <p:cBhvr>
+                                        <p:cTn id="8" dur="1" fill="hold">
+                                          <p:stCondLst>
+                                            <p:cond delay="0"/>
+                                          </p:stCondLst>
+                                        </p:cTn>
+                                        <p:tgtEl>
+                                          <p:spTgt spid="3">
+                                            <p:txEl>
+                                              <p:pRg st="1" end="1"/>
+                                            </p:txEl>
+                                          </p:spTgt>
+                                        </p:tgtEl>
+                                        <p:attrNameLst>
+                                          <p:attrName>style.visibility</p:attrName>
+                                        </p:attrNameLst>
+                                      </p:cBhvr>
+                                      <p:to>
+                                        <p:strVal val="visible"/>
+                                      </p:to>
+                                    </p:set>
+                                  </p:childTnLst>
+                                </p:cTn>
+                              </p:par>
+                              <p:par>
+                                <p:cTn id="9" presetID="1" presetClass="entr" presetSubtype="0" fill="hold" grpId="0" nodeType="withEffect">
+                                  <p:stCondLst>
+                                    <p:cond delay="0"/>
+                                  </p:stCondLst>
+                                  <p:childTnLst>
+                                    <p:set>
+                                      <p:cBhvr>
+                                        <p:cTn id="10" dur="1" fill="hold">
+                                          <p:stCondLst>
+                                            <p:cond delay="0"/>
+                                          </p:stCondLst>
+                                        </p:cTn>
+                                        <p:tgtEl>
+                                          <p:spTgt spid="3">
+                                            <p:txEl>
+                                              <p:pRg st="2" end="2"/>
+                                            </p:txEl>
+                                          </p:spTgt>
+                                        </p:tgtEl>
+                                        <p:attrNameLst>
+                                          <p:attrName>style.visibility</p:attrName>
+                                        </p:attrNameLst>
+                                      </p:cBhvr>
+                                      <p:to>
+                                        <p:strVal val="visible"/>
+                                      </p:to>
+                                    </p:set>
+                                  </p:childTnLst>
+                                </p:cTn>
+                              </p:par>
+                            </p:childTnLst>
+                          </p:cTn>
+                        </p:par>
+                      </p:childTnLst>
+                    </p:cTn>
+                  </p:par>
+                  <p:par>
+                    <p:cTn id="11" fill="hold">
+                      <p:stCondLst>
+                        <p:cond delay="indefinite"/>
+                      </p:stCondLst>
+                      <p:childTnLst>
+                        <p:par>
+                          <p:cTn id="12" fill="hold">
+                            <p:stCondLst>
+                              <p:cond delay="0"/>
+                            </p:stCondLst>
+                            <p:childTnLst>
+                              <p:par>
+                                <p:cTn id="13" presetID="1" presetClass="entr" presetSubtype="0" fill="hold" grpId="0" nodeType="clickEffect">
+                                  <p:stCondLst>
+                                    <p:cond delay="0"/>
+                                  </p:stCondLst>
+                                  <p:childTnLst>
+                                    <p:set>
+                                      <p:cBhvr>
+                                        <p:cTn id="14" dur="1" fill="hold">
+                                          <p:stCondLst>
+                                            <p:cond delay="0"/>
+                                          </p:stCondLst>
+                                        </p:cTn>
+                                        <p:tgtEl>
+                                          <p:spTgt spid="3">
+                                            <p:txEl>
+                                              <p:pRg st="3" end="3"/>
+                                            </p:txEl>
+                                          </p:spTgt>
+                                        </p:tgtEl>
+                                        <p:attrNameLst>
+                                          <p:attrName>style.visibility</p:attrName>
+                                        </p:attrNameLst>
+                                      </p:cBhvr>
+                                      <p:to>
+                                        <p:strVal val="visible"/>
+                                      </p:to>
+                                    </p:set>
+                                  </p:childTnLst>
+                                </p:cTn>
+                              </p:par>
+                            </p:childTnLst>
+                          </p:cTn>
+                        </p:par>
+                      </p:childTnLst>
+                    </p:cTn>
+                  </p:par>
+                  <p:par>
+                    <p:cTn id="15" fill="hold">
+                      <p:stCondLst>
+                        <p:cond delay="indefinite"/>
+                      </p:stCondLst>
+                      <p:childTnLst>
+                        <p:par>
+                          <p:cTn id="16" fill="hold">
+                            <p:stCondLst>
+                              <p:cond delay="0"/>
+                            </p:stCondLst>
+                            <p:childTnLst>
+                              <p:par>
+                                <p:cTn id="17" presetID="1" presetClass="entr" presetSubtype="0" fill="hold" grpId="0" nodeType="clickEffect">
+                                  <p:stCondLst>
+                                    <p:cond delay="0"/>
+                                  </p:stCondLst>
+                                  <p:childTnLst>
+                                    <p:set>
+                                      <p:cBhvr>
+                                        <p:cTn id="18" dur="1" fill="hold">
+                                          <p:stCondLst>
+                                            <p:cond delay="0"/>
+                                          </p:stCondLst>
+                                        </p:cTn>
+                                        <p:tgtEl>
+                                          <p:spTgt spid="3">
+                                            <p:txEl>
+                                              <p:pRg st="4" end="4"/>
+                                            </p:txEl>
+                                          </p:spTgt>
+                                        </p:tgtEl>
+                                        <p:attrNameLst>
+                                          <p:attrName>style.visibility</p:attrName>
+                                        </p:attrNameLst>
+                                      </p:cBhvr>
+                                      <p:to>
+                                        <p:strVal val="visible"/>
+                                      </p:to>
+                                    </p:set>
+                                  </p:childTnLst>
+                                </p:cTn>
+                              </p:par>
+                              <p:par>
+                                <p:cTn id="19" presetID="1" presetClass="entr" presetSubtype="0" fill="hold" grpId="0" nodeType="withEffect">
+                                  <p:stCondLst>
+                                    <p:cond delay="0"/>
+                                  </p:stCondLst>
+                                  <p:childTnLst>
+                                    <p:set>
+                                      <p:cBhvr>
+                                        <p:cTn id="20" dur="1" fill="hold">
+                                          <p:stCondLst>
+                                            <p:cond delay="0"/>
+                                          </p:stCondLst>
+                                        </p:cTn>
+                                        <p:tgtEl>
+                                          <p:spTgt spid="3">
+                                            <p:txEl>
+                                              <p:pRg st="5" end="5"/>
+                                            </p:txEl>
+                                          </p:spTgt>
+                                        </p:tgtEl>
+                                        <p:attrNameLst>
+                                          <p:attrName>style.visibility</p:attrName>
+                                        </p:attrNameLst>
+                                      </p:cBhvr>
+                                      <p:to>
+                                        <p:strVal val="visible"/>
+                                      </p:to>
+                                    </p:set>
+                                  </p:childTnLst>
+                                </p:cTn>
+                              </p:par>
+                            </p:childTnLst>
+                          </p:cTn>
+                        </p:par>
+                      </p:childTnLst>
+                    </p:cTn>
+                  </p:par>
+                </p:childTnLst>
+              </p:cTn>
+              <p:prevCondLst>
+                <p:cond evt="onPrev" delay="0">
+                  <p:tgtEl>
+                    <p:sldTgt/>
+                  </p:tgtEl>
+                </p:cond>
+              </p:prevCondLst>
+              <p:nextCondLst>
+                <p:cond evt="onNext" delay="0">
+                  <p:tgtEl>
+                    <p:sldTgt/>
+                  </p:tgtEl>
+                </p:cond>
+              </p:nextCondLst>
+            </p:seq>
+          </p:childTnLst>
+        </p:cTn>
+      </p:par>
+    </p:tnLst>
+    <p:bldLst>
+      <p:bldP spid="3" grpId="0" build="p"/>
+    </p:bldLst>
+  </p:timing>
 </p:sld>
 </file>
 
@@ -4497,6 +5564,328 @@
   <p:clrMapOvr>
     <a:masterClrMapping/>
   </p:clrMapOvr>
+  <p:timing>
+    <p:tnLst>
+      <p:par>
+        <p:cTn id="1" dur="indefinite" restart="never" nodeType="tmRoot">
+          <p:childTnLst>
+            <p:seq concurrent="1" nextAc="seek">
+              <p:cTn id="2" dur="indefinite" nodeType="mainSeq">
+                <p:childTnLst>
+                  <p:par>
+                    <p:cTn id="3" fill="hold">
+                      <p:stCondLst>
+                        <p:cond delay="indefinite"/>
+                      </p:stCondLst>
+                      <p:childTnLst>
+                        <p:par>
+                          <p:cTn id="4" fill="hold">
+                            <p:stCondLst>
+                              <p:cond delay="0"/>
+                            </p:stCondLst>
+                            <p:childTnLst>
+                              <p:par>
+                                <p:cTn id="5" presetID="1" presetClass="entr" presetSubtype="0" fill="hold" grpId="0" nodeType="clickEffect">
+                                  <p:stCondLst>
+                                    <p:cond delay="0"/>
+                                  </p:stCondLst>
+                                  <p:childTnLst>
+                                    <p:set>
+                                      <p:cBhvr>
+                                        <p:cTn id="6" dur="1" fill="hold">
+                                          <p:stCondLst>
+                                            <p:cond delay="0"/>
+                                          </p:stCondLst>
+                                        </p:cTn>
+                                        <p:tgtEl>
+                                          <p:spTgt spid="5">
+                                            <p:txEl>
+                                              <p:pRg st="0" end="0"/>
+                                            </p:txEl>
+                                          </p:spTgt>
+                                        </p:tgtEl>
+                                        <p:attrNameLst>
+                                          <p:attrName>style.visibility</p:attrName>
+                                        </p:attrNameLst>
+                                      </p:cBhvr>
+                                      <p:to>
+                                        <p:strVal val="visible"/>
+                                      </p:to>
+                                    </p:set>
+                                  </p:childTnLst>
+                                </p:cTn>
+                              </p:par>
+                            </p:childTnLst>
+                          </p:cTn>
+                        </p:par>
+                      </p:childTnLst>
+                    </p:cTn>
+                  </p:par>
+                  <p:par>
+                    <p:cTn id="7" fill="hold">
+                      <p:stCondLst>
+                        <p:cond delay="indefinite"/>
+                      </p:stCondLst>
+                      <p:childTnLst>
+                        <p:par>
+                          <p:cTn id="8" fill="hold">
+                            <p:stCondLst>
+                              <p:cond delay="0"/>
+                            </p:stCondLst>
+                            <p:childTnLst>
+                              <p:par>
+                                <p:cTn id="9" presetID="1" presetClass="entr" presetSubtype="0" fill="hold" grpId="0" nodeType="clickEffect">
+                                  <p:stCondLst>
+                                    <p:cond delay="0"/>
+                                  </p:stCondLst>
+                                  <p:childTnLst>
+                                    <p:set>
+                                      <p:cBhvr>
+                                        <p:cTn id="10" dur="1" fill="hold">
+                                          <p:stCondLst>
+                                            <p:cond delay="0"/>
+                                          </p:stCondLst>
+                                        </p:cTn>
+                                        <p:tgtEl>
+                                          <p:spTgt spid="5">
+                                            <p:txEl>
+                                              <p:pRg st="1" end="1"/>
+                                            </p:txEl>
+                                          </p:spTgt>
+                                        </p:tgtEl>
+                                        <p:attrNameLst>
+                                          <p:attrName>style.visibility</p:attrName>
+                                        </p:attrNameLst>
+                                      </p:cBhvr>
+                                      <p:to>
+                                        <p:strVal val="visible"/>
+                                      </p:to>
+                                    </p:set>
+                                  </p:childTnLst>
+                                </p:cTn>
+                              </p:par>
+                              <p:par>
+                                <p:cTn id="11" presetID="1" presetClass="entr" presetSubtype="0" fill="hold" grpId="0" nodeType="withEffect">
+                                  <p:stCondLst>
+                                    <p:cond delay="0"/>
+                                  </p:stCondLst>
+                                  <p:childTnLst>
+                                    <p:set>
+                                      <p:cBhvr>
+                                        <p:cTn id="12" dur="1" fill="hold">
+                                          <p:stCondLst>
+                                            <p:cond delay="0"/>
+                                          </p:stCondLst>
+                                        </p:cTn>
+                                        <p:tgtEl>
+                                          <p:spTgt spid="5">
+                                            <p:txEl>
+                                              <p:pRg st="2" end="2"/>
+                                            </p:txEl>
+                                          </p:spTgt>
+                                        </p:tgtEl>
+                                        <p:attrNameLst>
+                                          <p:attrName>style.visibility</p:attrName>
+                                        </p:attrNameLst>
+                                      </p:cBhvr>
+                                      <p:to>
+                                        <p:strVal val="visible"/>
+                                      </p:to>
+                                    </p:set>
+                                  </p:childTnLst>
+                                </p:cTn>
+                              </p:par>
+                            </p:childTnLst>
+                          </p:cTn>
+                        </p:par>
+                      </p:childTnLst>
+                    </p:cTn>
+                  </p:par>
+                  <p:par>
+                    <p:cTn id="13" fill="hold">
+                      <p:stCondLst>
+                        <p:cond delay="indefinite"/>
+                      </p:stCondLst>
+                      <p:childTnLst>
+                        <p:par>
+                          <p:cTn id="14" fill="hold">
+                            <p:stCondLst>
+                              <p:cond delay="0"/>
+                            </p:stCondLst>
+                            <p:childTnLst>
+                              <p:par>
+                                <p:cTn id="15" presetID="1" presetClass="entr" presetSubtype="0" fill="hold" grpId="0" nodeType="clickEffect">
+                                  <p:stCondLst>
+                                    <p:cond delay="0"/>
+                                  </p:stCondLst>
+                                  <p:childTnLst>
+                                    <p:set>
+                                      <p:cBhvr>
+                                        <p:cTn id="16" dur="1" fill="hold">
+                                          <p:stCondLst>
+                                            <p:cond delay="0"/>
+                                          </p:stCondLst>
+                                        </p:cTn>
+                                        <p:tgtEl>
+                                          <p:spTgt spid="5">
+                                            <p:txEl>
+                                              <p:pRg st="3" end="3"/>
+                                            </p:txEl>
+                                          </p:spTgt>
+                                        </p:tgtEl>
+                                        <p:attrNameLst>
+                                          <p:attrName>style.visibility</p:attrName>
+                                        </p:attrNameLst>
+                                      </p:cBhvr>
+                                      <p:to>
+                                        <p:strVal val="visible"/>
+                                      </p:to>
+                                    </p:set>
+                                  </p:childTnLst>
+                                </p:cTn>
+                              </p:par>
+                              <p:par>
+                                <p:cTn id="17" presetID="1" presetClass="entr" presetSubtype="0" fill="hold" grpId="0" nodeType="withEffect">
+                                  <p:stCondLst>
+                                    <p:cond delay="0"/>
+                                  </p:stCondLst>
+                                  <p:childTnLst>
+                                    <p:set>
+                                      <p:cBhvr>
+                                        <p:cTn id="18" dur="1" fill="hold">
+                                          <p:stCondLst>
+                                            <p:cond delay="0"/>
+                                          </p:stCondLst>
+                                        </p:cTn>
+                                        <p:tgtEl>
+                                          <p:spTgt spid="5">
+                                            <p:txEl>
+                                              <p:pRg st="4" end="4"/>
+                                            </p:txEl>
+                                          </p:spTgt>
+                                        </p:tgtEl>
+                                        <p:attrNameLst>
+                                          <p:attrName>style.visibility</p:attrName>
+                                        </p:attrNameLst>
+                                      </p:cBhvr>
+                                      <p:to>
+                                        <p:strVal val="visible"/>
+                                      </p:to>
+                                    </p:set>
+                                  </p:childTnLst>
+                                </p:cTn>
+                              </p:par>
+                            </p:childTnLst>
+                          </p:cTn>
+                        </p:par>
+                      </p:childTnLst>
+                    </p:cTn>
+                  </p:par>
+                  <p:par>
+                    <p:cTn id="19" fill="hold">
+                      <p:stCondLst>
+                        <p:cond delay="indefinite"/>
+                      </p:stCondLst>
+                      <p:childTnLst>
+                        <p:par>
+                          <p:cTn id="20" fill="hold">
+                            <p:stCondLst>
+                              <p:cond delay="0"/>
+                            </p:stCondLst>
+                            <p:childTnLst>
+                              <p:par>
+                                <p:cTn id="21" presetID="1" presetClass="entr" presetSubtype="0" fill="hold" grpId="0" nodeType="clickEffect">
+                                  <p:stCondLst>
+                                    <p:cond delay="0"/>
+                                  </p:stCondLst>
+                                  <p:childTnLst>
+                                    <p:set>
+                                      <p:cBhvr>
+                                        <p:cTn id="22" dur="1" fill="hold">
+                                          <p:stCondLst>
+                                            <p:cond delay="0"/>
+                                          </p:stCondLst>
+                                        </p:cTn>
+                                        <p:tgtEl>
+                                          <p:spTgt spid="5">
+                                            <p:txEl>
+                                              <p:pRg st="5" end="5"/>
+                                            </p:txEl>
+                                          </p:spTgt>
+                                        </p:tgtEl>
+                                        <p:attrNameLst>
+                                          <p:attrName>style.visibility</p:attrName>
+                                        </p:attrNameLst>
+                                      </p:cBhvr>
+                                      <p:to>
+                                        <p:strVal val="visible"/>
+                                      </p:to>
+                                    </p:set>
+                                  </p:childTnLst>
+                                </p:cTn>
+                              </p:par>
+                              <p:par>
+                                <p:cTn id="23" presetID="1" presetClass="entr" presetSubtype="0" fill="hold" grpId="0" nodeType="withEffect">
+                                  <p:stCondLst>
+                                    <p:cond delay="0"/>
+                                  </p:stCondLst>
+                                  <p:childTnLst>
+                                    <p:set>
+                                      <p:cBhvr>
+                                        <p:cTn id="24" dur="1" fill="hold">
+                                          <p:stCondLst>
+                                            <p:cond delay="0"/>
+                                          </p:stCondLst>
+                                        </p:cTn>
+                                        <p:tgtEl>
+                                          <p:spTgt spid="5">
+                                            <p:txEl>
+                                              <p:pRg st="6" end="6"/>
+                                            </p:txEl>
+                                          </p:spTgt>
+                                        </p:tgtEl>
+                                        <p:attrNameLst>
+                                          <p:attrName>style.visibility</p:attrName>
+                                        </p:attrNameLst>
+                                      </p:cBhvr>
+                                      <p:to>
+                                        <p:strVal val="visible"/>
+                                      </p:to>
+                                    </p:set>
+                                  </p:childTnLst>
+                                </p:cTn>
+                              </p:par>
+                            </p:childTnLst>
+                          </p:cTn>
+                        </p:par>
+                      </p:childTnLst>
+                    </p:cTn>
+                  </p:par>
+                </p:childTnLst>
+              </p:cTn>
+              <p:prevCondLst>
+                <p:cond evt="onPrev" delay="0">
+                  <p:tgtEl>
+                    <p:sldTgt/>
+                  </p:tgtEl>
+                </p:cond>
+              </p:prevCondLst>
+              <p:nextCondLst>
+                <p:cond evt="onNext" delay="0">
+                  <p:tgtEl>
+                    <p:sldTgt/>
+                  </p:tgtEl>
+                </p:cond>
+              </p:nextCondLst>
+            </p:seq>
+          </p:childTnLst>
+        </p:cTn>
+      </p:par>
+    </p:tnLst>
+    <p:bldLst>
+      <p:bldP spid="5" grpId="0" build="p"/>
+    </p:bldLst>
+  </p:timing>
 </p:sld>
 </file>
 
@@ -4691,6 +6080,199 @@
   <p:clrMapOvr>
     <a:masterClrMapping/>
   </p:clrMapOvr>
+  <p:timing>
+    <p:tnLst>
+      <p:par>
+        <p:cTn id="1" dur="indefinite" restart="never" nodeType="tmRoot">
+          <p:childTnLst>
+            <p:seq concurrent="1" nextAc="seek">
+              <p:cTn id="2" dur="indefinite" nodeType="mainSeq">
+                <p:childTnLst>
+                  <p:par>
+                    <p:cTn id="3" fill="hold">
+                      <p:stCondLst>
+                        <p:cond delay="indefinite"/>
+                      </p:stCondLst>
+                      <p:childTnLst>
+                        <p:par>
+                          <p:cTn id="4" fill="hold">
+                            <p:stCondLst>
+                              <p:cond delay="0"/>
+                            </p:stCondLst>
+                            <p:childTnLst>
+                              <p:par>
+                                <p:cTn id="5" presetID="1" presetClass="entr" presetSubtype="0" fill="hold" grpId="0" nodeType="clickEffect">
+                                  <p:stCondLst>
+                                    <p:cond delay="0"/>
+                                  </p:stCondLst>
+                                  <p:childTnLst>
+                                    <p:set>
+                                      <p:cBhvr>
+                                        <p:cTn id="6" dur="1" fill="hold">
+                                          <p:stCondLst>
+                                            <p:cond delay="0"/>
+                                          </p:stCondLst>
+                                        </p:cTn>
+                                        <p:tgtEl>
+                                          <p:spTgt spid="3">
+                                            <p:txEl>
+                                              <p:pRg st="0" end="0"/>
+                                            </p:txEl>
+                                          </p:spTgt>
+                                        </p:tgtEl>
+                                        <p:attrNameLst>
+                                          <p:attrName>style.visibility</p:attrName>
+                                        </p:attrNameLst>
+                                      </p:cBhvr>
+                                      <p:to>
+                                        <p:strVal val="visible"/>
+                                      </p:to>
+                                    </p:set>
+                                  </p:childTnLst>
+                                </p:cTn>
+                              </p:par>
+                              <p:par>
+                                <p:cTn id="7" presetID="1" presetClass="entr" presetSubtype="0" fill="hold" grpId="0" nodeType="withEffect">
+                                  <p:stCondLst>
+                                    <p:cond delay="0"/>
+                                  </p:stCondLst>
+                                  <p:childTnLst>
+                                    <p:set>
+                                      <p:cBhvr>
+                                        <p:cTn id="8" dur="1" fill="hold">
+                                          <p:stCondLst>
+                                            <p:cond delay="0"/>
+                                          </p:stCondLst>
+                                        </p:cTn>
+                                        <p:tgtEl>
+                                          <p:spTgt spid="3">
+                                            <p:txEl>
+                                              <p:pRg st="1" end="1"/>
+                                            </p:txEl>
+                                          </p:spTgt>
+                                        </p:tgtEl>
+                                        <p:attrNameLst>
+                                          <p:attrName>style.visibility</p:attrName>
+                                        </p:attrNameLst>
+                                      </p:cBhvr>
+                                      <p:to>
+                                        <p:strVal val="visible"/>
+                                      </p:to>
+                                    </p:set>
+                                  </p:childTnLst>
+                                </p:cTn>
+                              </p:par>
+                              <p:par>
+                                <p:cTn id="9" presetID="1" presetClass="entr" presetSubtype="0" fill="hold" grpId="0" nodeType="withEffect">
+                                  <p:stCondLst>
+                                    <p:cond delay="0"/>
+                                  </p:stCondLst>
+                                  <p:childTnLst>
+                                    <p:set>
+                                      <p:cBhvr>
+                                        <p:cTn id="10" dur="1" fill="hold">
+                                          <p:stCondLst>
+                                            <p:cond delay="0"/>
+                                          </p:stCondLst>
+                                        </p:cTn>
+                                        <p:tgtEl>
+                                          <p:spTgt spid="3">
+                                            <p:txEl>
+                                              <p:pRg st="2" end="2"/>
+                                            </p:txEl>
+                                          </p:spTgt>
+                                        </p:tgtEl>
+                                        <p:attrNameLst>
+                                          <p:attrName>style.visibility</p:attrName>
+                                        </p:attrNameLst>
+                                      </p:cBhvr>
+                                      <p:to>
+                                        <p:strVal val="visible"/>
+                                      </p:to>
+                                    </p:set>
+                                  </p:childTnLst>
+                                </p:cTn>
+                              </p:par>
+                            </p:childTnLst>
+                          </p:cTn>
+                        </p:par>
+                      </p:childTnLst>
+                    </p:cTn>
+                  </p:par>
+                  <p:par>
+                    <p:cTn id="11" fill="hold">
+                      <p:stCondLst>
+                        <p:cond delay="indefinite"/>
+                      </p:stCondLst>
+                      <p:childTnLst>
+                        <p:par>
+                          <p:cTn id="12" fill="hold">
+                            <p:stCondLst>
+                              <p:cond delay="0"/>
+                            </p:stCondLst>
+                            <p:childTnLst>
+                              <p:par>
+                                <p:cTn id="13" presetID="1" presetClass="entr" presetSubtype="0" fill="hold" grpId="0" nodeType="clickEffect">
+                                  <p:stCondLst>
+                                    <p:cond delay="0"/>
+                                  </p:stCondLst>
+                                  <p:childTnLst>
+                                    <p:set>
+                                      <p:cBhvr>
+                                        <p:cTn id="14" dur="1" fill="hold">
+                                          <p:stCondLst>
+                                            <p:cond delay="0"/>
+                                          </p:stCondLst>
+                                        </p:cTn>
+                                        <p:tgtEl>
+                                          <p:spTgt spid="3">
+                                            <p:txEl>
+                                              <p:pRg st="4" end="4"/>
+                                            </p:txEl>
+                                          </p:spTgt>
+                                        </p:tgtEl>
+                                        <p:attrNameLst>
+                                          <p:attrName>style.visibility</p:attrName>
+                                        </p:attrNameLst>
+                                      </p:cBhvr>
+                                      <p:to>
+                                        <p:strVal val="visible"/>
+                                      </p:to>
+                                    </p:set>
+                                  </p:childTnLst>
+                                </p:cTn>
+                              </p:par>
+                            </p:childTnLst>
+                          </p:cTn>
+                        </p:par>
+                      </p:childTnLst>
+                    </p:cTn>
+                  </p:par>
+                </p:childTnLst>
+              </p:cTn>
+              <p:prevCondLst>
+                <p:cond evt="onPrev" delay="0">
+                  <p:tgtEl>
+                    <p:sldTgt/>
+                  </p:tgtEl>
+                </p:cond>
+              </p:prevCondLst>
+              <p:nextCondLst>
+                <p:cond evt="onNext" delay="0">
+                  <p:tgtEl>
+                    <p:sldTgt/>
+                  </p:tgtEl>
+                </p:cond>
+              </p:nextCondLst>
+            </p:seq>
+          </p:childTnLst>
+        </p:cTn>
+      </p:par>
+    </p:tnLst>
+    <p:bldLst>
+      <p:bldP spid="3" grpId="0" build="p"/>
+    </p:bldLst>
+  </p:timing>
 </p:sld>
 </file>
 
@@ -4862,734 +6444,755 @@
           </a:prstGeom>
         </p:spPr>
       </p:pic>
-      <p:sp>
-        <p:nvSpPr>
-          <p:cNvPr id="5" name="Rectangle 4">
+      <p:grpSp>
+        <p:nvGrpSpPr>
+          <p:cNvPr id="8" name="Group 7">
             <a:extLst>
               <a:ext uri="{FF2B5EF4-FFF2-40B4-BE49-F238E27FC236}">
-                <a16:creationId xmlns:a16="http://schemas.microsoft.com/office/drawing/2014/main" id="{9BD105E8-DBEA-F543-54D8-71FA4B948C63}"/>
+                <a16:creationId xmlns:a16="http://schemas.microsoft.com/office/drawing/2014/main" id="{2337B164-F6BD-76A8-D6C1-0A870B6DBEA0}"/>
               </a:ext>
             </a:extLst>
           </p:cNvPr>
-          <p:cNvSpPr/>
+          <p:cNvGrpSpPr/>
           <p:nvPr/>
-        </p:nvSpPr>
-        <p:spPr>
+        </p:nvGrpSpPr>
+        <p:grpSpPr>
           <a:xfrm>
-            <a:off x="4406789" y="4407485"/>
-            <a:ext cx="2431912" cy="538480"/>
+            <a:off x="107058" y="4407485"/>
+            <a:ext cx="6731643" cy="1917677"/>
+            <a:chOff x="107058" y="4407485"/>
+            <a:chExt cx="6731643" cy="1917677"/>
           </a:xfrm>
-          <a:prstGeom prst="rect">
-            <a:avLst/>
-          </a:prstGeom>
-          <a:solidFill>
-            <a:schemeClr val="tx2">
-              <a:lumMod val="60000"/>
-              <a:lumOff val="40000"/>
-            </a:schemeClr>
-          </a:solidFill>
-          <a:ln>
+        </p:grpSpPr>
+        <p:sp>
+          <p:nvSpPr>
+            <p:cNvPr id="5" name="Rectangle 4">
+              <a:extLst>
+                <a:ext uri="{FF2B5EF4-FFF2-40B4-BE49-F238E27FC236}">
+                  <a16:creationId xmlns:a16="http://schemas.microsoft.com/office/drawing/2014/main" id="{9BD105E8-DBEA-F543-54D8-71FA4B948C63}"/>
+                </a:ext>
+              </a:extLst>
+            </p:cNvPr>
+            <p:cNvSpPr/>
+            <p:nvPr/>
+          </p:nvSpPr>
+          <p:spPr>
+            <a:xfrm>
+              <a:off x="4406789" y="4407485"/>
+              <a:ext cx="2431912" cy="538480"/>
+            </a:xfrm>
+            <a:prstGeom prst="rect">
+              <a:avLst/>
+            </a:prstGeom>
             <a:solidFill>
+              <a:schemeClr val="tx2">
+                <a:lumMod val="60000"/>
+                <a:lumOff val="40000"/>
+              </a:schemeClr>
+            </a:solidFill>
+            <a:ln>
+              <a:solidFill>
+                <a:schemeClr val="tx1"/>
+              </a:solidFill>
+            </a:ln>
+          </p:spPr>
+          <p:style>
+            <a:lnRef idx="1">
+              <a:schemeClr val="accent6"/>
+            </a:lnRef>
+            <a:fillRef idx="2">
+              <a:schemeClr val="accent6"/>
+            </a:fillRef>
+            <a:effectRef idx="1">
+              <a:schemeClr val="accent6"/>
+            </a:effectRef>
+            <a:fontRef idx="minor">
+              <a:schemeClr val="dk1"/>
+            </a:fontRef>
+          </p:style>
+          <p:txBody>
+            <a:bodyPr rtlCol="0" anchor="ctr"/>
+            <a:lstStyle/>
+            <a:p>
+              <a:pPr algn="ctr"/>
+              <a:r>
+                <a:rPr lang="en-US" dirty="0">
+                  <a:latin typeface="Arial" panose="020B0604020202020204" pitchFamily="34" charset="0"/>
+                  <a:cs typeface="Arial" panose="020B0604020202020204" pitchFamily="34" charset="0"/>
+                </a:rPr>
+                <a:t>7226</a:t>
+              </a:r>
+            </a:p>
+          </p:txBody>
+        </p:sp>
+        <p:sp>
+          <p:nvSpPr>
+            <p:cNvPr id="6" name="Rectangle 5">
+              <a:extLst>
+                <a:ext uri="{FF2B5EF4-FFF2-40B4-BE49-F238E27FC236}">
+                  <a16:creationId xmlns:a16="http://schemas.microsoft.com/office/drawing/2014/main" id="{8D193F6E-CEE2-9470-2F3E-29F2C896B3F7}"/>
+                </a:ext>
+              </a:extLst>
+            </p:cNvPr>
+            <p:cNvSpPr/>
+            <p:nvPr/>
+          </p:nvSpPr>
+          <p:spPr>
+            <a:xfrm>
+              <a:off x="991621" y="4407485"/>
+              <a:ext cx="897752" cy="538480"/>
+            </a:xfrm>
+            <a:prstGeom prst="rect">
+              <a:avLst/>
+            </a:prstGeom>
+            <a:solidFill>
+              <a:schemeClr val="accent6">
+                <a:lumMod val="75000"/>
+              </a:schemeClr>
+            </a:solidFill>
+            <a:ln>
+              <a:solidFill>
+                <a:schemeClr val="tx1"/>
+              </a:solidFill>
+            </a:ln>
+          </p:spPr>
+          <p:style>
+            <a:lnRef idx="1">
+              <a:schemeClr val="accent6"/>
+            </a:lnRef>
+            <a:fillRef idx="2">
+              <a:schemeClr val="accent6"/>
+            </a:fillRef>
+            <a:effectRef idx="1">
+              <a:schemeClr val="accent6"/>
+            </a:effectRef>
+            <a:fontRef idx="minor">
+              <a:schemeClr val="dk1"/>
+            </a:fontRef>
+          </p:style>
+          <p:txBody>
+            <a:bodyPr rtlCol="0" anchor="ctr"/>
+            <a:lstStyle/>
+            <a:p>
+              <a:pPr algn="ctr"/>
+              <a:r>
+                <a:rPr lang="en-US" dirty="0">
+                  <a:latin typeface="Arial" panose="020B0604020202020204" pitchFamily="34" charset="0"/>
+                  <a:cs typeface="Arial" panose="020B0604020202020204" pitchFamily="34" charset="0"/>
+                </a:rPr>
+                <a:t>1532</a:t>
+              </a:r>
+            </a:p>
+          </p:txBody>
+        </p:sp>
+        <p:sp>
+          <p:nvSpPr>
+            <p:cNvPr id="7" name="Rectangle 6">
+              <a:extLst>
+                <a:ext uri="{FF2B5EF4-FFF2-40B4-BE49-F238E27FC236}">
+                  <a16:creationId xmlns:a16="http://schemas.microsoft.com/office/drawing/2014/main" id="{404D0346-B844-4AD2-4765-F103E53C4D8A}"/>
+                </a:ext>
+              </a:extLst>
+            </p:cNvPr>
+            <p:cNvSpPr/>
+            <p:nvPr/>
+          </p:nvSpPr>
+          <p:spPr>
+            <a:xfrm>
+              <a:off x="4406789" y="4407485"/>
+              <a:ext cx="775832" cy="538480"/>
+            </a:xfrm>
+            <a:prstGeom prst="rect">
+              <a:avLst/>
+            </a:prstGeom>
+            <a:noFill/>
+            <a:ln w="38100">
+              <a:solidFill>
+                <a:schemeClr val="tx1"/>
+              </a:solidFill>
+              <a:prstDash val="dash"/>
+            </a:ln>
+          </p:spPr>
+          <p:style>
+            <a:lnRef idx="1">
+              <a:schemeClr val="accent6"/>
+            </a:lnRef>
+            <a:fillRef idx="2">
+              <a:schemeClr val="accent6"/>
+            </a:fillRef>
+            <a:effectRef idx="1">
+              <a:schemeClr val="accent6"/>
+            </a:effectRef>
+            <a:fontRef idx="minor">
+              <a:schemeClr val="dk1"/>
+            </a:fontRef>
+          </p:style>
+          <p:txBody>
+            <a:bodyPr rtlCol="0" anchor="ctr"/>
+            <a:lstStyle/>
+            <a:p>
+              <a:pPr algn="ctr"/>
+              <a:endParaRPr lang="en-US" dirty="0"/>
+            </a:p>
+          </p:txBody>
+        </p:sp>
+        <p:cxnSp>
+          <p:nvCxnSpPr>
+            <p:cNvPr id="11" name="Straight Arrow Connector 10">
+              <a:extLst>
+                <a:ext uri="{FF2B5EF4-FFF2-40B4-BE49-F238E27FC236}">
+                  <a16:creationId xmlns:a16="http://schemas.microsoft.com/office/drawing/2014/main" id="{10CBD74D-1097-D2C1-C44B-5AEC179F3095}"/>
+                </a:ext>
+              </a:extLst>
+            </p:cNvPr>
+            <p:cNvCxnSpPr>
+              <a:cxnSpLocks/>
+            </p:cNvCxnSpPr>
+            <p:nvPr/>
+          </p:nvCxnSpPr>
+          <p:spPr>
+            <a:xfrm flipH="1">
+              <a:off x="2960166" y="4666565"/>
+              <a:ext cx="1282976" cy="0"/>
+            </a:xfrm>
+            <a:prstGeom prst="straightConnector1">
+              <a:avLst/>
+            </a:prstGeom>
+            <a:ln>
+              <a:solidFill>
+                <a:schemeClr val="tx1"/>
+              </a:solidFill>
+              <a:tailEnd type="triangle"/>
+            </a:ln>
+          </p:spPr>
+          <p:style>
+            <a:lnRef idx="2">
+              <a:schemeClr val="accent1"/>
+            </a:lnRef>
+            <a:fillRef idx="0">
+              <a:schemeClr val="accent1"/>
+            </a:fillRef>
+            <a:effectRef idx="1">
+              <a:schemeClr val="accent1"/>
+            </a:effectRef>
+            <a:fontRef idx="minor">
               <a:schemeClr val="tx1"/>
+            </a:fontRef>
+          </p:style>
+        </p:cxnSp>
+        <p:sp>
+          <p:nvSpPr>
+            <p:cNvPr id="14" name="Rectangle 13">
+              <a:extLst>
+                <a:ext uri="{FF2B5EF4-FFF2-40B4-BE49-F238E27FC236}">
+                  <a16:creationId xmlns:a16="http://schemas.microsoft.com/office/drawing/2014/main" id="{4F9B77AD-4D2D-3C52-538F-5B6171074CE2}"/>
+                </a:ext>
+              </a:extLst>
+            </p:cNvPr>
+            <p:cNvSpPr/>
+            <p:nvPr/>
+          </p:nvSpPr>
+          <p:spPr>
+            <a:xfrm>
+              <a:off x="1889373" y="4407485"/>
+              <a:ext cx="897752" cy="538480"/>
+            </a:xfrm>
+            <a:prstGeom prst="rect">
+              <a:avLst/>
+            </a:prstGeom>
+            <a:solidFill>
+              <a:schemeClr val="tx2">
+                <a:lumMod val="60000"/>
+                <a:lumOff val="40000"/>
+              </a:schemeClr>
             </a:solidFill>
-          </a:ln>
-        </p:spPr>
-        <p:style>
-          <a:lnRef idx="1">
-            <a:schemeClr val="accent6"/>
-          </a:lnRef>
-          <a:fillRef idx="2">
-            <a:schemeClr val="accent6"/>
-          </a:fillRef>
-          <a:effectRef idx="1">
-            <a:schemeClr val="accent6"/>
-          </a:effectRef>
-          <a:fontRef idx="minor">
-            <a:schemeClr val="dk1"/>
-          </a:fontRef>
-        </p:style>
-        <p:txBody>
-          <a:bodyPr rtlCol="0" anchor="ctr"/>
-          <a:lstStyle/>
-          <a:p>
-            <a:pPr algn="ctr"/>
-            <a:r>
-              <a:rPr lang="en-US" dirty="0">
-                <a:latin typeface="Arial" panose="020B0604020202020204" pitchFamily="34" charset="0"/>
-                <a:cs typeface="Arial" panose="020B0604020202020204" pitchFamily="34" charset="0"/>
-              </a:rPr>
-              <a:t>7226</a:t>
-            </a:r>
-          </a:p>
-        </p:txBody>
-      </p:sp>
-      <p:sp>
-        <p:nvSpPr>
-          <p:cNvPr id="6" name="Rectangle 5">
-            <a:extLst>
-              <a:ext uri="{FF2B5EF4-FFF2-40B4-BE49-F238E27FC236}">
-                <a16:creationId xmlns:a16="http://schemas.microsoft.com/office/drawing/2014/main" id="{8D193F6E-CEE2-9470-2F3E-29F2C896B3F7}"/>
-              </a:ext>
-            </a:extLst>
-          </p:cNvPr>
-          <p:cNvSpPr/>
-          <p:nvPr/>
-        </p:nvSpPr>
-        <p:spPr>
-          <a:xfrm>
-            <a:off x="991621" y="4407485"/>
-            <a:ext cx="897752" cy="538480"/>
-          </a:xfrm>
-          <a:prstGeom prst="rect">
-            <a:avLst/>
-          </a:prstGeom>
-          <a:solidFill>
-            <a:schemeClr val="accent6">
-              <a:lumMod val="75000"/>
-            </a:schemeClr>
-          </a:solidFill>
-          <a:ln>
+            <a:ln>
+              <a:solidFill>
+                <a:schemeClr val="tx1"/>
+              </a:solidFill>
+            </a:ln>
+          </p:spPr>
+          <p:style>
+            <a:lnRef idx="1">
+              <a:schemeClr val="accent6"/>
+            </a:lnRef>
+            <a:fillRef idx="2">
+              <a:schemeClr val="accent6"/>
+            </a:fillRef>
+            <a:effectRef idx="1">
+              <a:schemeClr val="accent6"/>
+            </a:effectRef>
+            <a:fontRef idx="minor">
+              <a:schemeClr val="dk1"/>
+            </a:fontRef>
+          </p:style>
+          <p:txBody>
+            <a:bodyPr rtlCol="0" anchor="ctr"/>
+            <a:lstStyle/>
+            <a:p>
+              <a:pPr algn="ctr"/>
+              <a:r>
+                <a:rPr lang="en-US" dirty="0">
+                  <a:latin typeface="Arial" panose="020B0604020202020204" pitchFamily="34" charset="0"/>
+                  <a:cs typeface="Arial" panose="020B0604020202020204" pitchFamily="34" charset="0"/>
+                </a:rPr>
+                <a:t>1532</a:t>
+              </a:r>
+            </a:p>
+          </p:txBody>
+        </p:sp>
+        <p:sp>
+          <p:nvSpPr>
+            <p:cNvPr id="17" name="Rectangle 16">
+              <a:extLst>
+                <a:ext uri="{FF2B5EF4-FFF2-40B4-BE49-F238E27FC236}">
+                  <a16:creationId xmlns:a16="http://schemas.microsoft.com/office/drawing/2014/main" id="{7FDFC542-7295-97D9-BA87-BF7255F4D46D}"/>
+                </a:ext>
+              </a:extLst>
+            </p:cNvPr>
+            <p:cNvSpPr/>
+            <p:nvPr/>
+          </p:nvSpPr>
+          <p:spPr>
+            <a:xfrm>
+              <a:off x="238496" y="5397617"/>
+              <a:ext cx="753124" cy="538480"/>
+            </a:xfrm>
+            <a:prstGeom prst="rect">
+              <a:avLst/>
+            </a:prstGeom>
             <a:solidFill>
+              <a:schemeClr val="accent6">
+                <a:lumMod val="75000"/>
+              </a:schemeClr>
+            </a:solidFill>
+            <a:ln>
+              <a:solidFill>
+                <a:schemeClr val="tx1"/>
+              </a:solidFill>
+            </a:ln>
+          </p:spPr>
+          <p:style>
+            <a:lnRef idx="1">
+              <a:schemeClr val="accent6"/>
+            </a:lnRef>
+            <a:fillRef idx="2">
+              <a:schemeClr val="accent6"/>
+            </a:fillRef>
+            <a:effectRef idx="1">
+              <a:schemeClr val="accent6"/>
+            </a:effectRef>
+            <a:fontRef idx="minor">
+              <a:schemeClr val="dk1"/>
+            </a:fontRef>
+          </p:style>
+          <p:txBody>
+            <a:bodyPr rtlCol="0" anchor="ctr"/>
+            <a:lstStyle/>
+            <a:p>
+              <a:pPr algn="ctr"/>
+              <a:r>
+                <a:rPr lang="en-US" sz="1400" dirty="0">
+                  <a:latin typeface="Arial" panose="020B0604020202020204" pitchFamily="34" charset="0"/>
+                  <a:cs typeface="Arial" panose="020B0604020202020204" pitchFamily="34" charset="0"/>
+                </a:rPr>
+                <a:t>1225</a:t>
+              </a:r>
+            </a:p>
+          </p:txBody>
+        </p:sp>
+        <p:sp>
+          <p:nvSpPr>
+            <p:cNvPr id="18" name="Rectangle 17">
+              <a:extLst>
+                <a:ext uri="{FF2B5EF4-FFF2-40B4-BE49-F238E27FC236}">
+                  <a16:creationId xmlns:a16="http://schemas.microsoft.com/office/drawing/2014/main" id="{677811CE-A0FF-A8DF-70C0-A6DCF077FC85}"/>
+                </a:ext>
+              </a:extLst>
+            </p:cNvPr>
+            <p:cNvSpPr/>
+            <p:nvPr/>
+          </p:nvSpPr>
+          <p:spPr>
+            <a:xfrm>
+              <a:off x="991620" y="5397617"/>
+              <a:ext cx="753124" cy="538480"/>
+            </a:xfrm>
+            <a:prstGeom prst="rect">
+              <a:avLst/>
+            </a:prstGeom>
+            <a:solidFill>
+              <a:schemeClr val="tx2">
+                <a:lumMod val="60000"/>
+                <a:lumOff val="40000"/>
+              </a:schemeClr>
+            </a:solidFill>
+            <a:ln>
+              <a:solidFill>
+                <a:schemeClr val="tx1"/>
+              </a:solidFill>
+            </a:ln>
+          </p:spPr>
+          <p:style>
+            <a:lnRef idx="1">
+              <a:schemeClr val="accent6"/>
+            </a:lnRef>
+            <a:fillRef idx="2">
+              <a:schemeClr val="accent6"/>
+            </a:fillRef>
+            <a:effectRef idx="1">
+              <a:schemeClr val="accent6"/>
+            </a:effectRef>
+            <a:fontRef idx="minor">
+              <a:schemeClr val="dk1"/>
+            </a:fontRef>
+          </p:style>
+          <p:txBody>
+            <a:bodyPr rtlCol="0" anchor="ctr"/>
+            <a:lstStyle/>
+            <a:p>
+              <a:pPr algn="ctr"/>
+              <a:r>
+                <a:rPr lang="en-US" sz="1400" dirty="0">
+                  <a:latin typeface="Arial" panose="020B0604020202020204" pitchFamily="34" charset="0"/>
+                  <a:cs typeface="Arial" panose="020B0604020202020204" pitchFamily="34" charset="0"/>
+                </a:rPr>
+                <a:t>1225</a:t>
+              </a:r>
+            </a:p>
+          </p:txBody>
+        </p:sp>
+        <p:sp>
+          <p:nvSpPr>
+            <p:cNvPr id="19" name="Rectangle 18">
+              <a:extLst>
+                <a:ext uri="{FF2B5EF4-FFF2-40B4-BE49-F238E27FC236}">
+                  <a16:creationId xmlns:a16="http://schemas.microsoft.com/office/drawing/2014/main" id="{9EED507D-D356-20BE-B902-1D9436589D18}"/>
+                </a:ext>
+              </a:extLst>
+            </p:cNvPr>
+            <p:cNvSpPr/>
+            <p:nvPr/>
+          </p:nvSpPr>
+          <p:spPr>
+            <a:xfrm>
+              <a:off x="2268673" y="5397617"/>
+              <a:ext cx="508000" cy="538480"/>
+            </a:xfrm>
+            <a:prstGeom prst="rect">
+              <a:avLst/>
+            </a:prstGeom>
+            <a:solidFill>
+              <a:schemeClr val="accent6">
+                <a:lumMod val="75000"/>
+              </a:schemeClr>
+            </a:solidFill>
+            <a:ln>
+              <a:solidFill>
+                <a:schemeClr val="tx1"/>
+              </a:solidFill>
+            </a:ln>
+          </p:spPr>
+          <p:style>
+            <a:lnRef idx="1">
+              <a:schemeClr val="accent6"/>
+            </a:lnRef>
+            <a:fillRef idx="2">
+              <a:schemeClr val="accent6"/>
+            </a:fillRef>
+            <a:effectRef idx="1">
+              <a:schemeClr val="accent6"/>
+            </a:effectRef>
+            <a:fontRef idx="minor">
+              <a:schemeClr val="dk1"/>
+            </a:fontRef>
+          </p:style>
+          <p:txBody>
+            <a:bodyPr rtlCol="0" anchor="ctr"/>
+            <a:lstStyle/>
+            <a:p>
+              <a:pPr algn="ctr"/>
+              <a:r>
+                <a:rPr lang="en-US" sz="1400" dirty="0">
+                  <a:latin typeface="Arial" panose="020B0604020202020204" pitchFamily="34" charset="0"/>
+                  <a:cs typeface="Arial" panose="020B0604020202020204" pitchFamily="34" charset="0"/>
+                </a:rPr>
+                <a:t>307</a:t>
+              </a:r>
+            </a:p>
+          </p:txBody>
+        </p:sp>
+        <p:sp>
+          <p:nvSpPr>
+            <p:cNvPr id="20" name="Rectangle 19">
+              <a:extLst>
+                <a:ext uri="{FF2B5EF4-FFF2-40B4-BE49-F238E27FC236}">
+                  <a16:creationId xmlns:a16="http://schemas.microsoft.com/office/drawing/2014/main" id="{D552B285-370B-EB1C-3299-B780C5E47416}"/>
+                </a:ext>
+              </a:extLst>
+            </p:cNvPr>
+            <p:cNvSpPr/>
+            <p:nvPr/>
+          </p:nvSpPr>
+          <p:spPr>
+            <a:xfrm>
+              <a:off x="2784997" y="5397617"/>
+              <a:ext cx="508000" cy="538480"/>
+            </a:xfrm>
+            <a:prstGeom prst="rect">
+              <a:avLst/>
+            </a:prstGeom>
+            <a:solidFill>
+              <a:schemeClr val="tx2">
+                <a:lumMod val="60000"/>
+                <a:lumOff val="40000"/>
+              </a:schemeClr>
+            </a:solidFill>
+            <a:ln>
+              <a:solidFill>
+                <a:schemeClr val="tx1"/>
+              </a:solidFill>
+            </a:ln>
+          </p:spPr>
+          <p:style>
+            <a:lnRef idx="1">
+              <a:schemeClr val="accent6"/>
+            </a:lnRef>
+            <a:fillRef idx="2">
+              <a:schemeClr val="accent6"/>
+            </a:fillRef>
+            <a:effectRef idx="1">
+              <a:schemeClr val="accent6"/>
+            </a:effectRef>
+            <a:fontRef idx="minor">
+              <a:schemeClr val="dk1"/>
+            </a:fontRef>
+          </p:style>
+          <p:txBody>
+            <a:bodyPr rtlCol="0" anchor="ctr"/>
+            <a:lstStyle/>
+            <a:p>
+              <a:pPr algn="ctr"/>
+              <a:r>
+                <a:rPr lang="en-US" sz="1400" dirty="0">
+                  <a:latin typeface="Arial" panose="020B0604020202020204" pitchFamily="34" charset="0"/>
+                  <a:cs typeface="Arial" panose="020B0604020202020204" pitchFamily="34" charset="0"/>
+                </a:rPr>
+                <a:t>307</a:t>
+              </a:r>
+            </a:p>
+          </p:txBody>
+        </p:sp>
+        <p:sp>
+          <p:nvSpPr>
+            <p:cNvPr id="23" name="TextBox 22">
+              <a:extLst>
+                <a:ext uri="{FF2B5EF4-FFF2-40B4-BE49-F238E27FC236}">
+                  <a16:creationId xmlns:a16="http://schemas.microsoft.com/office/drawing/2014/main" id="{DC658FDA-8900-7066-044D-1E150B523AF8}"/>
+                </a:ext>
+              </a:extLst>
+            </p:cNvPr>
+            <p:cNvSpPr txBox="1"/>
+            <p:nvPr/>
+          </p:nvSpPr>
+          <p:spPr>
+            <a:xfrm>
+              <a:off x="2775540" y="4722902"/>
+              <a:ext cx="1676400" cy="338554"/>
+            </a:xfrm>
+            <a:prstGeom prst="rect">
+              <a:avLst/>
+            </a:prstGeom>
+            <a:noFill/>
+          </p:spPr>
+          <p:txBody>
+            <a:bodyPr wrap="square" rtlCol="0">
+              <a:spAutoFit/>
+            </a:bodyPr>
+            <a:lstStyle/>
+            <a:p>
+              <a:pPr algn="ctr"/>
+              <a:r>
+                <a:rPr lang="en-US" sz="1600" dirty="0">
+                  <a:latin typeface="Arial" panose="020B0604020202020204" pitchFamily="34" charset="0"/>
+                  <a:cs typeface="Arial" panose="020B0604020202020204" pitchFamily="34" charset="0"/>
+                </a:rPr>
+                <a:t>Subsampling</a:t>
+              </a:r>
+            </a:p>
+          </p:txBody>
+        </p:sp>
+        <p:sp>
+          <p:nvSpPr>
+            <p:cNvPr id="24" name="TextBox 23">
+              <a:extLst>
+                <a:ext uri="{FF2B5EF4-FFF2-40B4-BE49-F238E27FC236}">
+                  <a16:creationId xmlns:a16="http://schemas.microsoft.com/office/drawing/2014/main" id="{76B6E5AA-8C41-D06B-9706-CA4657BF4B79}"/>
+                </a:ext>
+              </a:extLst>
+            </p:cNvPr>
+            <p:cNvSpPr txBox="1"/>
+            <p:nvPr/>
+          </p:nvSpPr>
+          <p:spPr>
+            <a:xfrm>
+              <a:off x="4553540" y="5031433"/>
+              <a:ext cx="2183356" cy="338554"/>
+            </a:xfrm>
+            <a:prstGeom prst="rect">
+              <a:avLst/>
+            </a:prstGeom>
+            <a:noFill/>
+          </p:spPr>
+          <p:txBody>
+            <a:bodyPr wrap="square" rtlCol="0">
+              <a:spAutoFit/>
+            </a:bodyPr>
+            <a:lstStyle/>
+            <a:p>
+              <a:pPr algn="ctr"/>
+              <a:r>
+                <a:rPr lang="en-US" sz="1600" dirty="0">
+                  <a:latin typeface="Arial" panose="020B0604020202020204" pitchFamily="34" charset="0"/>
+                  <a:cs typeface="Arial" panose="020B0604020202020204" pitchFamily="34" charset="0"/>
+                </a:rPr>
+                <a:t>Negative Examples</a:t>
+              </a:r>
+            </a:p>
+          </p:txBody>
+        </p:sp>
+        <p:sp>
+          <p:nvSpPr>
+            <p:cNvPr id="25" name="Left Brace 24">
+              <a:extLst>
+                <a:ext uri="{FF2B5EF4-FFF2-40B4-BE49-F238E27FC236}">
+                  <a16:creationId xmlns:a16="http://schemas.microsoft.com/office/drawing/2014/main" id="{847C1BAD-AB22-38E4-83B6-C3C0B48EAC43}"/>
+                </a:ext>
+              </a:extLst>
+            </p:cNvPr>
+            <p:cNvSpPr/>
+            <p:nvPr/>
+          </p:nvSpPr>
+          <p:spPr>
+            <a:xfrm rot="5400000">
+              <a:off x="1775125" y="4277952"/>
+              <a:ext cx="226367" cy="1793376"/>
+            </a:xfrm>
+            <a:prstGeom prst="leftBrace">
+              <a:avLst>
+                <a:gd name="adj1" fmla="val 0"/>
+                <a:gd name="adj2" fmla="val 50000"/>
+              </a:avLst>
+            </a:prstGeom>
+            <a:noFill/>
+            <a:ln>
+              <a:solidFill>
+                <a:schemeClr val="tx1"/>
+              </a:solidFill>
+            </a:ln>
+          </p:spPr>
+          <p:style>
+            <a:lnRef idx="2">
+              <a:schemeClr val="accent1"/>
+            </a:lnRef>
+            <a:fillRef idx="0">
+              <a:schemeClr val="accent1"/>
+            </a:fillRef>
+            <a:effectRef idx="1">
+              <a:schemeClr val="accent1"/>
+            </a:effectRef>
+            <a:fontRef idx="minor">
               <a:schemeClr val="tx1"/>
-            </a:solidFill>
-          </a:ln>
-        </p:spPr>
-        <p:style>
-          <a:lnRef idx="1">
-            <a:schemeClr val="accent6"/>
-          </a:lnRef>
-          <a:fillRef idx="2">
-            <a:schemeClr val="accent6"/>
-          </a:fillRef>
-          <a:effectRef idx="1">
-            <a:schemeClr val="accent6"/>
-          </a:effectRef>
-          <a:fontRef idx="minor">
-            <a:schemeClr val="dk1"/>
-          </a:fontRef>
-        </p:style>
-        <p:txBody>
-          <a:bodyPr rtlCol="0" anchor="ctr"/>
-          <a:lstStyle/>
-          <a:p>
-            <a:pPr algn="ctr"/>
-            <a:r>
-              <a:rPr lang="en-US" dirty="0">
-                <a:latin typeface="Arial" panose="020B0604020202020204" pitchFamily="34" charset="0"/>
-                <a:cs typeface="Arial" panose="020B0604020202020204" pitchFamily="34" charset="0"/>
-              </a:rPr>
-              <a:t>1532</a:t>
-            </a:r>
-          </a:p>
-        </p:txBody>
-      </p:sp>
-      <p:sp>
-        <p:nvSpPr>
-          <p:cNvPr id="7" name="Rectangle 6">
-            <a:extLst>
-              <a:ext uri="{FF2B5EF4-FFF2-40B4-BE49-F238E27FC236}">
-                <a16:creationId xmlns:a16="http://schemas.microsoft.com/office/drawing/2014/main" id="{404D0346-B844-4AD2-4765-F103E53C4D8A}"/>
-              </a:ext>
-            </a:extLst>
-          </p:cNvPr>
-          <p:cNvSpPr/>
-          <p:nvPr/>
-        </p:nvSpPr>
-        <p:spPr>
-          <a:xfrm>
-            <a:off x="4406789" y="4407485"/>
-            <a:ext cx="775832" cy="538480"/>
-          </a:xfrm>
-          <a:prstGeom prst="rect">
-            <a:avLst/>
-          </a:prstGeom>
-          <a:noFill/>
-          <a:ln w="38100">
-            <a:solidFill>
-              <a:schemeClr val="tx1"/>
-            </a:solidFill>
-            <a:prstDash val="dash"/>
-          </a:ln>
-        </p:spPr>
-        <p:style>
-          <a:lnRef idx="1">
-            <a:schemeClr val="accent6"/>
-          </a:lnRef>
-          <a:fillRef idx="2">
-            <a:schemeClr val="accent6"/>
-          </a:fillRef>
-          <a:effectRef idx="1">
-            <a:schemeClr val="accent6"/>
-          </a:effectRef>
-          <a:fontRef idx="minor">
-            <a:schemeClr val="dk1"/>
-          </a:fontRef>
-        </p:style>
-        <p:txBody>
-          <a:bodyPr rtlCol="0" anchor="ctr"/>
-          <a:lstStyle/>
-          <a:p>
-            <a:pPr algn="ctr"/>
-            <a:endParaRPr lang="en-US" dirty="0"/>
-          </a:p>
-        </p:txBody>
-      </p:sp>
-      <p:cxnSp>
-        <p:nvCxnSpPr>
-          <p:cNvPr id="11" name="Straight Arrow Connector 10">
-            <a:extLst>
-              <a:ext uri="{FF2B5EF4-FFF2-40B4-BE49-F238E27FC236}">
-                <a16:creationId xmlns:a16="http://schemas.microsoft.com/office/drawing/2014/main" id="{10CBD74D-1097-D2C1-C44B-5AEC179F3095}"/>
-              </a:ext>
-            </a:extLst>
-          </p:cNvPr>
-          <p:cNvCxnSpPr>
-            <a:cxnSpLocks/>
-          </p:cNvCxnSpPr>
-          <p:nvPr/>
-        </p:nvCxnSpPr>
-        <p:spPr>
-          <a:xfrm flipH="1">
-            <a:off x="2960166" y="4666565"/>
-            <a:ext cx="1282976" cy="0"/>
-          </a:xfrm>
-          <a:prstGeom prst="straightConnector1">
-            <a:avLst/>
-          </a:prstGeom>
-          <a:ln>
-            <a:solidFill>
-              <a:schemeClr val="tx1"/>
-            </a:solidFill>
-            <a:tailEnd type="triangle"/>
-          </a:ln>
-        </p:spPr>
-        <p:style>
-          <a:lnRef idx="2">
-            <a:schemeClr val="accent1"/>
-          </a:lnRef>
-          <a:fillRef idx="0">
-            <a:schemeClr val="accent1"/>
-          </a:fillRef>
-          <a:effectRef idx="1">
-            <a:schemeClr val="accent1"/>
-          </a:effectRef>
-          <a:fontRef idx="minor">
-            <a:schemeClr val="tx1"/>
-          </a:fontRef>
-        </p:style>
-      </p:cxnSp>
-      <p:sp>
-        <p:nvSpPr>
-          <p:cNvPr id="14" name="Rectangle 13">
-            <a:extLst>
-              <a:ext uri="{FF2B5EF4-FFF2-40B4-BE49-F238E27FC236}">
-                <a16:creationId xmlns:a16="http://schemas.microsoft.com/office/drawing/2014/main" id="{4F9B77AD-4D2D-3C52-538F-5B6171074CE2}"/>
-              </a:ext>
-            </a:extLst>
-          </p:cNvPr>
-          <p:cNvSpPr/>
-          <p:nvPr/>
-        </p:nvSpPr>
-        <p:spPr>
-          <a:xfrm>
-            <a:off x="1889373" y="4407485"/>
-            <a:ext cx="897752" cy="538480"/>
-          </a:xfrm>
-          <a:prstGeom prst="rect">
-            <a:avLst/>
-          </a:prstGeom>
-          <a:solidFill>
-            <a:schemeClr val="tx2">
-              <a:lumMod val="60000"/>
-              <a:lumOff val="40000"/>
-            </a:schemeClr>
-          </a:solidFill>
-          <a:ln>
-            <a:solidFill>
-              <a:schemeClr val="tx1"/>
-            </a:solidFill>
-          </a:ln>
-        </p:spPr>
-        <p:style>
-          <a:lnRef idx="1">
-            <a:schemeClr val="accent6"/>
-          </a:lnRef>
-          <a:fillRef idx="2">
-            <a:schemeClr val="accent6"/>
-          </a:fillRef>
-          <a:effectRef idx="1">
-            <a:schemeClr val="accent6"/>
-          </a:effectRef>
-          <a:fontRef idx="minor">
-            <a:schemeClr val="dk1"/>
-          </a:fontRef>
-        </p:style>
-        <p:txBody>
-          <a:bodyPr rtlCol="0" anchor="ctr"/>
-          <a:lstStyle/>
-          <a:p>
-            <a:pPr algn="ctr"/>
-            <a:r>
-              <a:rPr lang="en-US" dirty="0">
-                <a:latin typeface="Arial" panose="020B0604020202020204" pitchFamily="34" charset="0"/>
-                <a:cs typeface="Arial" panose="020B0604020202020204" pitchFamily="34" charset="0"/>
-              </a:rPr>
-              <a:t>1532</a:t>
-            </a:r>
-          </a:p>
-        </p:txBody>
-      </p:sp>
-      <p:sp>
-        <p:nvSpPr>
-          <p:cNvPr id="17" name="Rectangle 16">
-            <a:extLst>
-              <a:ext uri="{FF2B5EF4-FFF2-40B4-BE49-F238E27FC236}">
-                <a16:creationId xmlns:a16="http://schemas.microsoft.com/office/drawing/2014/main" id="{7FDFC542-7295-97D9-BA87-BF7255F4D46D}"/>
-              </a:ext>
-            </a:extLst>
-          </p:cNvPr>
-          <p:cNvSpPr/>
-          <p:nvPr/>
-        </p:nvSpPr>
-        <p:spPr>
-          <a:xfrm>
-            <a:off x="238496" y="5397617"/>
-            <a:ext cx="753124" cy="538480"/>
-          </a:xfrm>
-          <a:prstGeom prst="rect">
-            <a:avLst/>
-          </a:prstGeom>
-          <a:solidFill>
-            <a:schemeClr val="accent6">
-              <a:lumMod val="75000"/>
-            </a:schemeClr>
-          </a:solidFill>
-          <a:ln>
-            <a:solidFill>
-              <a:schemeClr val="tx1"/>
-            </a:solidFill>
-          </a:ln>
-        </p:spPr>
-        <p:style>
-          <a:lnRef idx="1">
-            <a:schemeClr val="accent6"/>
-          </a:lnRef>
-          <a:fillRef idx="2">
-            <a:schemeClr val="accent6"/>
-          </a:fillRef>
-          <a:effectRef idx="1">
-            <a:schemeClr val="accent6"/>
-          </a:effectRef>
-          <a:fontRef idx="minor">
-            <a:schemeClr val="dk1"/>
-          </a:fontRef>
-        </p:style>
-        <p:txBody>
-          <a:bodyPr rtlCol="0" anchor="ctr"/>
-          <a:lstStyle/>
-          <a:p>
-            <a:pPr algn="ctr"/>
-            <a:r>
-              <a:rPr lang="en-US" sz="1400" dirty="0">
-                <a:latin typeface="Arial" panose="020B0604020202020204" pitchFamily="34" charset="0"/>
-                <a:cs typeface="Arial" panose="020B0604020202020204" pitchFamily="34" charset="0"/>
-              </a:rPr>
-              <a:t>1225</a:t>
-            </a:r>
-          </a:p>
-        </p:txBody>
-      </p:sp>
-      <p:sp>
-        <p:nvSpPr>
-          <p:cNvPr id="18" name="Rectangle 17">
-            <a:extLst>
-              <a:ext uri="{FF2B5EF4-FFF2-40B4-BE49-F238E27FC236}">
-                <a16:creationId xmlns:a16="http://schemas.microsoft.com/office/drawing/2014/main" id="{677811CE-A0FF-A8DF-70C0-A6DCF077FC85}"/>
-              </a:ext>
-            </a:extLst>
-          </p:cNvPr>
-          <p:cNvSpPr/>
-          <p:nvPr/>
-        </p:nvSpPr>
-        <p:spPr>
-          <a:xfrm>
-            <a:off x="991620" y="5397617"/>
-            <a:ext cx="753124" cy="538480"/>
-          </a:xfrm>
-          <a:prstGeom prst="rect">
-            <a:avLst/>
-          </a:prstGeom>
-          <a:solidFill>
-            <a:schemeClr val="tx2">
-              <a:lumMod val="60000"/>
-              <a:lumOff val="40000"/>
-            </a:schemeClr>
-          </a:solidFill>
-          <a:ln>
-            <a:solidFill>
-              <a:schemeClr val="tx1"/>
-            </a:solidFill>
-          </a:ln>
-        </p:spPr>
-        <p:style>
-          <a:lnRef idx="1">
-            <a:schemeClr val="accent6"/>
-          </a:lnRef>
-          <a:fillRef idx="2">
-            <a:schemeClr val="accent6"/>
-          </a:fillRef>
-          <a:effectRef idx="1">
-            <a:schemeClr val="accent6"/>
-          </a:effectRef>
-          <a:fontRef idx="minor">
-            <a:schemeClr val="dk1"/>
-          </a:fontRef>
-        </p:style>
-        <p:txBody>
-          <a:bodyPr rtlCol="0" anchor="ctr"/>
-          <a:lstStyle/>
-          <a:p>
-            <a:pPr algn="ctr"/>
-            <a:r>
-              <a:rPr lang="en-US" sz="1400" dirty="0">
-                <a:latin typeface="Arial" panose="020B0604020202020204" pitchFamily="34" charset="0"/>
-                <a:cs typeface="Arial" panose="020B0604020202020204" pitchFamily="34" charset="0"/>
-              </a:rPr>
-              <a:t>1225</a:t>
-            </a:r>
-          </a:p>
-        </p:txBody>
-      </p:sp>
-      <p:sp>
-        <p:nvSpPr>
-          <p:cNvPr id="19" name="Rectangle 18">
-            <a:extLst>
-              <a:ext uri="{FF2B5EF4-FFF2-40B4-BE49-F238E27FC236}">
-                <a16:creationId xmlns:a16="http://schemas.microsoft.com/office/drawing/2014/main" id="{9EED507D-D356-20BE-B902-1D9436589D18}"/>
-              </a:ext>
-            </a:extLst>
-          </p:cNvPr>
-          <p:cNvSpPr/>
-          <p:nvPr/>
-        </p:nvSpPr>
-        <p:spPr>
-          <a:xfrm>
-            <a:off x="2268673" y="5397617"/>
-            <a:ext cx="508000" cy="538480"/>
-          </a:xfrm>
-          <a:prstGeom prst="rect">
-            <a:avLst/>
-          </a:prstGeom>
-          <a:solidFill>
-            <a:schemeClr val="accent6">
-              <a:lumMod val="75000"/>
-            </a:schemeClr>
-          </a:solidFill>
-          <a:ln>
-            <a:solidFill>
-              <a:schemeClr val="tx1"/>
-            </a:solidFill>
-          </a:ln>
-        </p:spPr>
-        <p:style>
-          <a:lnRef idx="1">
-            <a:schemeClr val="accent6"/>
-          </a:lnRef>
-          <a:fillRef idx="2">
-            <a:schemeClr val="accent6"/>
-          </a:fillRef>
-          <a:effectRef idx="1">
-            <a:schemeClr val="accent6"/>
-          </a:effectRef>
-          <a:fontRef idx="minor">
-            <a:schemeClr val="dk1"/>
-          </a:fontRef>
-        </p:style>
-        <p:txBody>
-          <a:bodyPr rtlCol="0" anchor="ctr"/>
-          <a:lstStyle/>
-          <a:p>
-            <a:pPr algn="ctr"/>
-            <a:r>
-              <a:rPr lang="en-US" sz="1400" dirty="0">
-                <a:latin typeface="Arial" panose="020B0604020202020204" pitchFamily="34" charset="0"/>
-                <a:cs typeface="Arial" panose="020B0604020202020204" pitchFamily="34" charset="0"/>
-              </a:rPr>
-              <a:t>307</a:t>
-            </a:r>
-          </a:p>
-        </p:txBody>
-      </p:sp>
-      <p:sp>
-        <p:nvSpPr>
-          <p:cNvPr id="20" name="Rectangle 19">
-            <a:extLst>
-              <a:ext uri="{FF2B5EF4-FFF2-40B4-BE49-F238E27FC236}">
-                <a16:creationId xmlns:a16="http://schemas.microsoft.com/office/drawing/2014/main" id="{D552B285-370B-EB1C-3299-B780C5E47416}"/>
-              </a:ext>
-            </a:extLst>
-          </p:cNvPr>
-          <p:cNvSpPr/>
-          <p:nvPr/>
-        </p:nvSpPr>
-        <p:spPr>
-          <a:xfrm>
-            <a:off x="2784997" y="5397617"/>
-            <a:ext cx="508000" cy="538480"/>
-          </a:xfrm>
-          <a:prstGeom prst="rect">
-            <a:avLst/>
-          </a:prstGeom>
-          <a:solidFill>
-            <a:schemeClr val="tx2">
-              <a:lumMod val="60000"/>
-              <a:lumOff val="40000"/>
-            </a:schemeClr>
-          </a:solidFill>
-          <a:ln>
-            <a:solidFill>
-              <a:schemeClr val="tx1"/>
-            </a:solidFill>
-          </a:ln>
-        </p:spPr>
-        <p:style>
-          <a:lnRef idx="1">
-            <a:schemeClr val="accent6"/>
-          </a:lnRef>
-          <a:fillRef idx="2">
-            <a:schemeClr val="accent6"/>
-          </a:fillRef>
-          <a:effectRef idx="1">
-            <a:schemeClr val="accent6"/>
-          </a:effectRef>
-          <a:fontRef idx="minor">
-            <a:schemeClr val="dk1"/>
-          </a:fontRef>
-        </p:style>
-        <p:txBody>
-          <a:bodyPr rtlCol="0" anchor="ctr"/>
-          <a:lstStyle/>
-          <a:p>
-            <a:pPr algn="ctr"/>
-            <a:r>
-              <a:rPr lang="en-US" sz="1400" dirty="0">
-                <a:latin typeface="Arial" panose="020B0604020202020204" pitchFamily="34" charset="0"/>
-                <a:cs typeface="Arial" panose="020B0604020202020204" pitchFamily="34" charset="0"/>
-              </a:rPr>
-              <a:t>307</a:t>
-            </a:r>
-          </a:p>
-        </p:txBody>
-      </p:sp>
-      <p:sp>
-        <p:nvSpPr>
-          <p:cNvPr id="23" name="TextBox 22">
-            <a:extLst>
-              <a:ext uri="{FF2B5EF4-FFF2-40B4-BE49-F238E27FC236}">
-                <a16:creationId xmlns:a16="http://schemas.microsoft.com/office/drawing/2014/main" id="{DC658FDA-8900-7066-044D-1E150B523AF8}"/>
-              </a:ext>
-            </a:extLst>
-          </p:cNvPr>
-          <p:cNvSpPr txBox="1"/>
-          <p:nvPr/>
-        </p:nvSpPr>
-        <p:spPr>
-          <a:xfrm>
-            <a:off x="2775540" y="4722902"/>
-            <a:ext cx="1676400" cy="338554"/>
-          </a:xfrm>
-          <a:prstGeom prst="rect">
-            <a:avLst/>
-          </a:prstGeom>
-          <a:noFill/>
-        </p:spPr>
-        <p:txBody>
-          <a:bodyPr wrap="square" rtlCol="0">
-            <a:spAutoFit/>
-          </a:bodyPr>
-          <a:lstStyle/>
-          <a:p>
-            <a:pPr algn="ctr"/>
-            <a:r>
-              <a:rPr lang="en-US" sz="1600" dirty="0">
-                <a:latin typeface="Arial" panose="020B0604020202020204" pitchFamily="34" charset="0"/>
-                <a:cs typeface="Arial" panose="020B0604020202020204" pitchFamily="34" charset="0"/>
-              </a:rPr>
-              <a:t>Subsampling</a:t>
-            </a:r>
-          </a:p>
-        </p:txBody>
-      </p:sp>
-      <p:sp>
-        <p:nvSpPr>
-          <p:cNvPr id="24" name="TextBox 23">
-            <a:extLst>
-              <a:ext uri="{FF2B5EF4-FFF2-40B4-BE49-F238E27FC236}">
-                <a16:creationId xmlns:a16="http://schemas.microsoft.com/office/drawing/2014/main" id="{76B6E5AA-8C41-D06B-9706-CA4657BF4B79}"/>
-              </a:ext>
-            </a:extLst>
-          </p:cNvPr>
-          <p:cNvSpPr txBox="1"/>
-          <p:nvPr/>
-        </p:nvSpPr>
-        <p:spPr>
-          <a:xfrm>
-            <a:off x="4553540" y="5031433"/>
-            <a:ext cx="2183356" cy="338554"/>
-          </a:xfrm>
-          <a:prstGeom prst="rect">
-            <a:avLst/>
-          </a:prstGeom>
-          <a:noFill/>
-        </p:spPr>
-        <p:txBody>
-          <a:bodyPr wrap="square" rtlCol="0">
-            <a:spAutoFit/>
-          </a:bodyPr>
-          <a:lstStyle/>
-          <a:p>
-            <a:pPr algn="ctr"/>
-            <a:r>
-              <a:rPr lang="en-US" sz="1600" dirty="0">
-                <a:latin typeface="Arial" panose="020B0604020202020204" pitchFamily="34" charset="0"/>
-                <a:cs typeface="Arial" panose="020B0604020202020204" pitchFamily="34" charset="0"/>
-              </a:rPr>
-              <a:t>Negative Examples</a:t>
-            </a:r>
-          </a:p>
-        </p:txBody>
-      </p:sp>
-      <p:sp>
-        <p:nvSpPr>
-          <p:cNvPr id="25" name="Left Brace 24">
-            <a:extLst>
-              <a:ext uri="{FF2B5EF4-FFF2-40B4-BE49-F238E27FC236}">
-                <a16:creationId xmlns:a16="http://schemas.microsoft.com/office/drawing/2014/main" id="{847C1BAD-AB22-38E4-83B6-C3C0B48EAC43}"/>
-              </a:ext>
-            </a:extLst>
-          </p:cNvPr>
-          <p:cNvSpPr/>
-          <p:nvPr/>
-        </p:nvSpPr>
-        <p:spPr>
-          <a:xfrm rot="5400000">
-            <a:off x="1775125" y="4277952"/>
-            <a:ext cx="226367" cy="1793376"/>
-          </a:xfrm>
-          <a:prstGeom prst="leftBrace">
-            <a:avLst>
-              <a:gd name="adj1" fmla="val 0"/>
-              <a:gd name="adj2" fmla="val 50000"/>
-            </a:avLst>
-          </a:prstGeom>
-          <a:noFill/>
-          <a:ln>
-            <a:solidFill>
-              <a:schemeClr val="tx1"/>
-            </a:solidFill>
-          </a:ln>
-        </p:spPr>
-        <p:style>
-          <a:lnRef idx="2">
-            <a:schemeClr val="accent1"/>
-          </a:lnRef>
-          <a:fillRef idx="0">
-            <a:schemeClr val="accent1"/>
-          </a:fillRef>
-          <a:effectRef idx="1">
-            <a:schemeClr val="accent1"/>
-          </a:effectRef>
-          <a:fontRef idx="minor">
-            <a:schemeClr val="tx1"/>
-          </a:fontRef>
-        </p:style>
-        <p:txBody>
-          <a:bodyPr rtlCol="0" anchor="ctr"/>
-          <a:lstStyle/>
-          <a:p>
-            <a:pPr algn="ctr"/>
-            <a:endParaRPr lang="en-US"/>
-          </a:p>
-        </p:txBody>
-      </p:sp>
-      <p:sp>
-        <p:nvSpPr>
-          <p:cNvPr id="26" name="TextBox 25">
-            <a:extLst>
-              <a:ext uri="{FF2B5EF4-FFF2-40B4-BE49-F238E27FC236}">
-                <a16:creationId xmlns:a16="http://schemas.microsoft.com/office/drawing/2014/main" id="{B6C56EC3-1D08-E9A3-CEBE-99F023202C41}"/>
-              </a:ext>
-            </a:extLst>
-          </p:cNvPr>
-          <p:cNvSpPr txBox="1"/>
-          <p:nvPr/>
-        </p:nvSpPr>
-        <p:spPr>
-          <a:xfrm>
-            <a:off x="107058" y="5986608"/>
-            <a:ext cx="1676400" cy="338554"/>
-          </a:xfrm>
-          <a:prstGeom prst="rect">
-            <a:avLst/>
-          </a:prstGeom>
-          <a:noFill/>
-        </p:spPr>
-        <p:txBody>
-          <a:bodyPr wrap="square" rtlCol="0">
-            <a:spAutoFit/>
-          </a:bodyPr>
-          <a:lstStyle/>
-          <a:p>
-            <a:pPr algn="ctr"/>
-            <a:r>
-              <a:rPr lang="en-US" sz="1600" dirty="0">
-                <a:latin typeface="Arial" panose="020B0604020202020204" pitchFamily="34" charset="0"/>
-                <a:cs typeface="Arial" panose="020B0604020202020204" pitchFamily="34" charset="0"/>
-              </a:rPr>
-              <a:t>Train</a:t>
-            </a:r>
-          </a:p>
-        </p:txBody>
-      </p:sp>
-      <p:sp>
-        <p:nvSpPr>
-          <p:cNvPr id="27" name="TextBox 26">
-            <a:extLst>
-              <a:ext uri="{FF2B5EF4-FFF2-40B4-BE49-F238E27FC236}">
-                <a16:creationId xmlns:a16="http://schemas.microsoft.com/office/drawing/2014/main" id="{745015B6-CF23-CC9D-C722-221BA93DEA85}"/>
-              </a:ext>
-            </a:extLst>
-          </p:cNvPr>
-          <p:cNvSpPr txBox="1"/>
-          <p:nvPr/>
-        </p:nvSpPr>
-        <p:spPr>
-          <a:xfrm>
-            <a:off x="1946797" y="5966261"/>
-            <a:ext cx="1676400" cy="338554"/>
-          </a:xfrm>
-          <a:prstGeom prst="rect">
-            <a:avLst/>
-          </a:prstGeom>
-          <a:noFill/>
-        </p:spPr>
-        <p:txBody>
-          <a:bodyPr wrap="square" rtlCol="0">
-            <a:spAutoFit/>
-          </a:bodyPr>
-          <a:lstStyle/>
-          <a:p>
-            <a:pPr algn="ctr"/>
-            <a:r>
-              <a:rPr lang="en-US" sz="1600" dirty="0">
-                <a:latin typeface="Arial" panose="020B0604020202020204" pitchFamily="34" charset="0"/>
-                <a:cs typeface="Arial" panose="020B0604020202020204" pitchFamily="34" charset="0"/>
-              </a:rPr>
-              <a:t>Test</a:t>
-            </a:r>
-          </a:p>
-        </p:txBody>
-      </p:sp>
+            </a:fontRef>
+          </p:style>
+          <p:txBody>
+            <a:bodyPr rtlCol="0" anchor="ctr"/>
+            <a:lstStyle/>
+            <a:p>
+              <a:pPr algn="ctr"/>
+              <a:endParaRPr lang="en-US"/>
+            </a:p>
+          </p:txBody>
+        </p:sp>
+        <p:sp>
+          <p:nvSpPr>
+            <p:cNvPr id="26" name="TextBox 25">
+              <a:extLst>
+                <a:ext uri="{FF2B5EF4-FFF2-40B4-BE49-F238E27FC236}">
+                  <a16:creationId xmlns:a16="http://schemas.microsoft.com/office/drawing/2014/main" id="{B6C56EC3-1D08-E9A3-CEBE-99F023202C41}"/>
+                </a:ext>
+              </a:extLst>
+            </p:cNvPr>
+            <p:cNvSpPr txBox="1"/>
+            <p:nvPr/>
+          </p:nvSpPr>
+          <p:spPr>
+            <a:xfrm>
+              <a:off x="107058" y="5986608"/>
+              <a:ext cx="1676400" cy="338554"/>
+            </a:xfrm>
+            <a:prstGeom prst="rect">
+              <a:avLst/>
+            </a:prstGeom>
+            <a:noFill/>
+          </p:spPr>
+          <p:txBody>
+            <a:bodyPr wrap="square" rtlCol="0">
+              <a:spAutoFit/>
+            </a:bodyPr>
+            <a:lstStyle/>
+            <a:p>
+              <a:pPr algn="ctr"/>
+              <a:r>
+                <a:rPr lang="en-US" sz="1600" dirty="0">
+                  <a:latin typeface="Arial" panose="020B0604020202020204" pitchFamily="34" charset="0"/>
+                  <a:cs typeface="Arial" panose="020B0604020202020204" pitchFamily="34" charset="0"/>
+                </a:rPr>
+                <a:t>Train</a:t>
+              </a:r>
+            </a:p>
+          </p:txBody>
+        </p:sp>
+        <p:sp>
+          <p:nvSpPr>
+            <p:cNvPr id="27" name="TextBox 26">
+              <a:extLst>
+                <a:ext uri="{FF2B5EF4-FFF2-40B4-BE49-F238E27FC236}">
+                  <a16:creationId xmlns:a16="http://schemas.microsoft.com/office/drawing/2014/main" id="{745015B6-CF23-CC9D-C722-221BA93DEA85}"/>
+                </a:ext>
+              </a:extLst>
+            </p:cNvPr>
+            <p:cNvSpPr txBox="1"/>
+            <p:nvPr/>
+          </p:nvSpPr>
+          <p:spPr>
+            <a:xfrm>
+              <a:off x="1946797" y="5966261"/>
+              <a:ext cx="1676400" cy="338554"/>
+            </a:xfrm>
+            <a:prstGeom prst="rect">
+              <a:avLst/>
+            </a:prstGeom>
+            <a:noFill/>
+          </p:spPr>
+          <p:txBody>
+            <a:bodyPr wrap="square" rtlCol="0">
+              <a:spAutoFit/>
+            </a:bodyPr>
+            <a:lstStyle/>
+            <a:p>
+              <a:pPr algn="ctr"/>
+              <a:r>
+                <a:rPr lang="en-US" sz="1600" dirty="0">
+                  <a:latin typeface="Arial" panose="020B0604020202020204" pitchFamily="34" charset="0"/>
+                  <a:cs typeface="Arial" panose="020B0604020202020204" pitchFamily="34" charset="0"/>
+                </a:rPr>
+                <a:t>Test</a:t>
+              </a:r>
+            </a:p>
+          </p:txBody>
+        </p:sp>
+      </p:grpSp>
       <p:sp>
         <p:nvSpPr>
           <p:cNvPr id="28" name="TextBox 27">
@@ -5639,6 +7242,306 @@
   <p:clrMapOvr>
     <a:masterClrMapping/>
   </p:clrMapOvr>
+  <p:timing>
+    <p:tnLst>
+      <p:par>
+        <p:cTn id="1" dur="indefinite" restart="never" nodeType="tmRoot">
+          <p:childTnLst>
+            <p:seq concurrent="1" nextAc="seek">
+              <p:cTn id="2" dur="indefinite" nodeType="mainSeq">
+                <p:childTnLst>
+                  <p:par>
+                    <p:cTn id="3" fill="hold">
+                      <p:stCondLst>
+                        <p:cond delay="indefinite"/>
+                      </p:stCondLst>
+                      <p:childTnLst>
+                        <p:par>
+                          <p:cTn id="4" fill="hold">
+                            <p:stCondLst>
+                              <p:cond delay="0"/>
+                            </p:stCondLst>
+                            <p:childTnLst>
+                              <p:par>
+                                <p:cTn id="5" presetID="1" presetClass="entr" presetSubtype="0" fill="hold" grpId="0" nodeType="clickEffect">
+                                  <p:stCondLst>
+                                    <p:cond delay="0"/>
+                                  </p:stCondLst>
+                                  <p:childTnLst>
+                                    <p:set>
+                                      <p:cBhvr>
+                                        <p:cTn id="6" dur="1" fill="hold">
+                                          <p:stCondLst>
+                                            <p:cond delay="0"/>
+                                          </p:stCondLst>
+                                        </p:cTn>
+                                        <p:tgtEl>
+                                          <p:spTgt spid="3">
+                                            <p:txEl>
+                                              <p:pRg st="0" end="0"/>
+                                            </p:txEl>
+                                          </p:spTgt>
+                                        </p:tgtEl>
+                                        <p:attrNameLst>
+                                          <p:attrName>style.visibility</p:attrName>
+                                        </p:attrNameLst>
+                                      </p:cBhvr>
+                                      <p:to>
+                                        <p:strVal val="visible"/>
+                                      </p:to>
+                                    </p:set>
+                                  </p:childTnLst>
+                                </p:cTn>
+                              </p:par>
+                              <p:par>
+                                <p:cTn id="7" presetID="1" presetClass="entr" presetSubtype="0" fill="hold" grpId="0" nodeType="withEffect">
+                                  <p:stCondLst>
+                                    <p:cond delay="0"/>
+                                  </p:stCondLst>
+                                  <p:childTnLst>
+                                    <p:set>
+                                      <p:cBhvr>
+                                        <p:cTn id="8" dur="1" fill="hold">
+                                          <p:stCondLst>
+                                            <p:cond delay="0"/>
+                                          </p:stCondLst>
+                                        </p:cTn>
+                                        <p:tgtEl>
+                                          <p:spTgt spid="3">
+                                            <p:txEl>
+                                              <p:pRg st="1" end="1"/>
+                                            </p:txEl>
+                                          </p:spTgt>
+                                        </p:tgtEl>
+                                        <p:attrNameLst>
+                                          <p:attrName>style.visibility</p:attrName>
+                                        </p:attrNameLst>
+                                      </p:cBhvr>
+                                      <p:to>
+                                        <p:strVal val="visible"/>
+                                      </p:to>
+                                    </p:set>
+                                  </p:childTnLst>
+                                </p:cTn>
+                              </p:par>
+                              <p:par>
+                                <p:cTn id="9" presetID="1" presetClass="entr" presetSubtype="0" fill="hold" grpId="0" nodeType="withEffect">
+                                  <p:stCondLst>
+                                    <p:cond delay="0"/>
+                                  </p:stCondLst>
+                                  <p:childTnLst>
+                                    <p:set>
+                                      <p:cBhvr>
+                                        <p:cTn id="10" dur="1" fill="hold">
+                                          <p:stCondLst>
+                                            <p:cond delay="0"/>
+                                          </p:stCondLst>
+                                        </p:cTn>
+                                        <p:tgtEl>
+                                          <p:spTgt spid="3">
+                                            <p:txEl>
+                                              <p:pRg st="2" end="2"/>
+                                            </p:txEl>
+                                          </p:spTgt>
+                                        </p:tgtEl>
+                                        <p:attrNameLst>
+                                          <p:attrName>style.visibility</p:attrName>
+                                        </p:attrNameLst>
+                                      </p:cBhvr>
+                                      <p:to>
+                                        <p:strVal val="visible"/>
+                                      </p:to>
+                                    </p:set>
+                                  </p:childTnLst>
+                                </p:cTn>
+                              </p:par>
+                            </p:childTnLst>
+                          </p:cTn>
+                        </p:par>
+                      </p:childTnLst>
+                    </p:cTn>
+                  </p:par>
+                  <p:par>
+                    <p:cTn id="11" fill="hold">
+                      <p:stCondLst>
+                        <p:cond delay="indefinite"/>
+                      </p:stCondLst>
+                      <p:childTnLst>
+                        <p:par>
+                          <p:cTn id="12" fill="hold">
+                            <p:stCondLst>
+                              <p:cond delay="0"/>
+                            </p:stCondLst>
+                            <p:childTnLst>
+                              <p:par>
+                                <p:cTn id="13" presetID="1" presetClass="entr" presetSubtype="0" fill="hold" grpId="0" nodeType="clickEffect">
+                                  <p:stCondLst>
+                                    <p:cond delay="0"/>
+                                  </p:stCondLst>
+                                  <p:childTnLst>
+                                    <p:set>
+                                      <p:cBhvr>
+                                        <p:cTn id="14" dur="1" fill="hold">
+                                          <p:stCondLst>
+                                            <p:cond delay="0"/>
+                                          </p:stCondLst>
+                                        </p:cTn>
+                                        <p:tgtEl>
+                                          <p:spTgt spid="3">
+                                            <p:txEl>
+                                              <p:pRg st="3" end="3"/>
+                                            </p:txEl>
+                                          </p:spTgt>
+                                        </p:tgtEl>
+                                        <p:attrNameLst>
+                                          <p:attrName>style.visibility</p:attrName>
+                                        </p:attrNameLst>
+                                      </p:cBhvr>
+                                      <p:to>
+                                        <p:strVal val="visible"/>
+                                      </p:to>
+                                    </p:set>
+                                  </p:childTnLst>
+                                </p:cTn>
+                              </p:par>
+                              <p:par>
+                                <p:cTn id="15" presetID="1" presetClass="entr" presetSubtype="0" fill="hold" grpId="0" nodeType="withEffect">
+                                  <p:stCondLst>
+                                    <p:cond delay="0"/>
+                                  </p:stCondLst>
+                                  <p:childTnLst>
+                                    <p:set>
+                                      <p:cBhvr>
+                                        <p:cTn id="16" dur="1" fill="hold">
+                                          <p:stCondLst>
+                                            <p:cond delay="0"/>
+                                          </p:stCondLst>
+                                        </p:cTn>
+                                        <p:tgtEl>
+                                          <p:spTgt spid="3">
+                                            <p:txEl>
+                                              <p:pRg st="4" end="4"/>
+                                            </p:txEl>
+                                          </p:spTgt>
+                                        </p:tgtEl>
+                                        <p:attrNameLst>
+                                          <p:attrName>style.visibility</p:attrName>
+                                        </p:attrNameLst>
+                                      </p:cBhvr>
+                                      <p:to>
+                                        <p:strVal val="visible"/>
+                                      </p:to>
+                                    </p:set>
+                                  </p:childTnLst>
+                                </p:cTn>
+                              </p:par>
+                              <p:par>
+                                <p:cTn id="17" presetID="1" presetClass="entr" presetSubtype="0" fill="hold" grpId="0" nodeType="withEffect">
+                                  <p:stCondLst>
+                                    <p:cond delay="0"/>
+                                  </p:stCondLst>
+                                  <p:childTnLst>
+                                    <p:set>
+                                      <p:cBhvr>
+                                        <p:cTn id="18" dur="1" fill="hold">
+                                          <p:stCondLst>
+                                            <p:cond delay="0"/>
+                                          </p:stCondLst>
+                                        </p:cTn>
+                                        <p:tgtEl>
+                                          <p:spTgt spid="3">
+                                            <p:txEl>
+                                              <p:pRg st="5" end="5"/>
+                                            </p:txEl>
+                                          </p:spTgt>
+                                        </p:tgtEl>
+                                        <p:attrNameLst>
+                                          <p:attrName>style.visibility</p:attrName>
+                                        </p:attrNameLst>
+                                      </p:cBhvr>
+                                      <p:to>
+                                        <p:strVal val="visible"/>
+                                      </p:to>
+                                    </p:set>
+                                  </p:childTnLst>
+                                </p:cTn>
+                              </p:par>
+                            </p:childTnLst>
+                          </p:cTn>
+                        </p:par>
+                      </p:childTnLst>
+                    </p:cTn>
+                  </p:par>
+                  <p:par>
+                    <p:cTn id="19" fill="hold">
+                      <p:stCondLst>
+                        <p:cond delay="indefinite"/>
+                      </p:stCondLst>
+                      <p:childTnLst>
+                        <p:par>
+                          <p:cTn id="20" fill="hold">
+                            <p:stCondLst>
+                              <p:cond delay="0"/>
+                            </p:stCondLst>
+                            <p:childTnLst>
+                              <p:par>
+                                <p:cTn id="21" presetID="1" presetClass="entr" presetSubtype="0" fill="hold" nodeType="clickEffect">
+                                  <p:stCondLst>
+                                    <p:cond delay="0"/>
+                                  </p:stCondLst>
+                                  <p:childTnLst>
+                                    <p:set>
+                                      <p:cBhvr>
+                                        <p:cTn id="22" dur="1" fill="hold">
+                                          <p:stCondLst>
+                                            <p:cond delay="0"/>
+                                          </p:stCondLst>
+                                        </p:cTn>
+                                        <p:tgtEl>
+                                          <p:spTgt spid="8"/>
+                                        </p:tgtEl>
+                                        <p:attrNameLst>
+                                          <p:attrName>style.visibility</p:attrName>
+                                        </p:attrNameLst>
+                                      </p:cBhvr>
+                                      <p:to>
+                                        <p:strVal val="visible"/>
+                                      </p:to>
+                                    </p:set>
+                                  </p:childTnLst>
+                                </p:cTn>
+                              </p:par>
+                            </p:childTnLst>
+                          </p:cTn>
+                        </p:par>
+                      </p:childTnLst>
+                    </p:cTn>
+                  </p:par>
+                </p:childTnLst>
+              </p:cTn>
+              <p:prevCondLst>
+                <p:cond evt="onPrev" delay="0">
+                  <p:tgtEl>
+                    <p:sldTgt/>
+                  </p:tgtEl>
+                </p:cond>
+              </p:prevCondLst>
+              <p:nextCondLst>
+                <p:cond evt="onNext" delay="0">
+                  <p:tgtEl>
+                    <p:sldTgt/>
+                  </p:tgtEl>
+                </p:cond>
+              </p:nextCondLst>
+            </p:seq>
+          </p:childTnLst>
+        </p:cTn>
+      </p:par>
+    </p:tnLst>
+    <p:bldLst>
+      <p:bldP spid="3" grpId="0" build="p"/>
+    </p:bldLst>
+  </p:timing>
 </p:sld>
 </file>
 
@@ -5989,6 +7892,230 @@
   <p:clrMapOvr>
     <a:masterClrMapping/>
   </p:clrMapOvr>
+  <p:timing>
+    <p:tnLst>
+      <p:par>
+        <p:cTn id="1" dur="indefinite" restart="never" nodeType="tmRoot">
+          <p:childTnLst>
+            <p:seq concurrent="1" nextAc="seek">
+              <p:cTn id="2" dur="indefinite" nodeType="mainSeq">
+                <p:childTnLst>
+                  <p:par>
+                    <p:cTn id="3" fill="hold">
+                      <p:stCondLst>
+                        <p:cond delay="indefinite"/>
+                      </p:stCondLst>
+                      <p:childTnLst>
+                        <p:par>
+                          <p:cTn id="4" fill="hold">
+                            <p:stCondLst>
+                              <p:cond delay="0"/>
+                            </p:stCondLst>
+                            <p:childTnLst>
+                              <p:par>
+                                <p:cTn id="5" presetID="1" presetClass="entr" presetSubtype="0" fill="hold" grpId="0" nodeType="clickEffect">
+                                  <p:stCondLst>
+                                    <p:cond delay="0"/>
+                                  </p:stCondLst>
+                                  <p:childTnLst>
+                                    <p:set>
+                                      <p:cBhvr>
+                                        <p:cTn id="6" dur="1" fill="hold">
+                                          <p:stCondLst>
+                                            <p:cond delay="0"/>
+                                          </p:stCondLst>
+                                        </p:cTn>
+                                        <p:tgtEl>
+                                          <p:spTgt spid="3">
+                                            <p:txEl>
+                                              <p:pRg st="0" end="0"/>
+                                            </p:txEl>
+                                          </p:spTgt>
+                                        </p:tgtEl>
+                                        <p:attrNameLst>
+                                          <p:attrName>style.visibility</p:attrName>
+                                        </p:attrNameLst>
+                                      </p:cBhvr>
+                                      <p:to>
+                                        <p:strVal val="visible"/>
+                                      </p:to>
+                                    </p:set>
+                                  </p:childTnLst>
+                                </p:cTn>
+                              </p:par>
+                              <p:par>
+                                <p:cTn id="7" presetID="1" presetClass="entr" presetSubtype="0" fill="hold" grpId="0" nodeType="withEffect">
+                                  <p:stCondLst>
+                                    <p:cond delay="0"/>
+                                  </p:stCondLst>
+                                  <p:childTnLst>
+                                    <p:set>
+                                      <p:cBhvr>
+                                        <p:cTn id="8" dur="1" fill="hold">
+                                          <p:stCondLst>
+                                            <p:cond delay="0"/>
+                                          </p:stCondLst>
+                                        </p:cTn>
+                                        <p:tgtEl>
+                                          <p:spTgt spid="3">
+                                            <p:txEl>
+                                              <p:pRg st="1" end="1"/>
+                                            </p:txEl>
+                                          </p:spTgt>
+                                        </p:tgtEl>
+                                        <p:attrNameLst>
+                                          <p:attrName>style.visibility</p:attrName>
+                                        </p:attrNameLst>
+                                      </p:cBhvr>
+                                      <p:to>
+                                        <p:strVal val="visible"/>
+                                      </p:to>
+                                    </p:set>
+                                  </p:childTnLst>
+                                </p:cTn>
+                              </p:par>
+                              <p:par>
+                                <p:cTn id="9" presetID="1" presetClass="entr" presetSubtype="0" fill="hold" grpId="0" nodeType="withEffect">
+                                  <p:stCondLst>
+                                    <p:cond delay="0"/>
+                                  </p:stCondLst>
+                                  <p:childTnLst>
+                                    <p:set>
+                                      <p:cBhvr>
+                                        <p:cTn id="10" dur="1" fill="hold">
+                                          <p:stCondLst>
+                                            <p:cond delay="0"/>
+                                          </p:stCondLst>
+                                        </p:cTn>
+                                        <p:tgtEl>
+                                          <p:spTgt spid="3">
+                                            <p:txEl>
+                                              <p:pRg st="2" end="2"/>
+                                            </p:txEl>
+                                          </p:spTgt>
+                                        </p:tgtEl>
+                                        <p:attrNameLst>
+                                          <p:attrName>style.visibility</p:attrName>
+                                        </p:attrNameLst>
+                                      </p:cBhvr>
+                                      <p:to>
+                                        <p:strVal val="visible"/>
+                                      </p:to>
+                                    </p:set>
+                                  </p:childTnLst>
+                                </p:cTn>
+                              </p:par>
+                            </p:childTnLst>
+                          </p:cTn>
+                        </p:par>
+                      </p:childTnLst>
+                    </p:cTn>
+                  </p:par>
+                  <p:par>
+                    <p:cTn id="11" fill="hold">
+                      <p:stCondLst>
+                        <p:cond delay="indefinite"/>
+                      </p:stCondLst>
+                      <p:childTnLst>
+                        <p:par>
+                          <p:cTn id="12" fill="hold">
+                            <p:stCondLst>
+                              <p:cond delay="0"/>
+                            </p:stCondLst>
+                            <p:childTnLst>
+                              <p:par>
+                                <p:cTn id="13" presetID="1" presetClass="entr" presetSubtype="0" fill="hold" grpId="0" nodeType="clickEffect">
+                                  <p:stCondLst>
+                                    <p:cond delay="0"/>
+                                  </p:stCondLst>
+                                  <p:childTnLst>
+                                    <p:set>
+                                      <p:cBhvr>
+                                        <p:cTn id="14" dur="1" fill="hold">
+                                          <p:stCondLst>
+                                            <p:cond delay="0"/>
+                                          </p:stCondLst>
+                                        </p:cTn>
+                                        <p:tgtEl>
+                                          <p:spTgt spid="3">
+                                            <p:txEl>
+                                              <p:pRg st="3" end="3"/>
+                                            </p:txEl>
+                                          </p:spTgt>
+                                        </p:tgtEl>
+                                        <p:attrNameLst>
+                                          <p:attrName>style.visibility</p:attrName>
+                                        </p:attrNameLst>
+                                      </p:cBhvr>
+                                      <p:to>
+                                        <p:strVal val="visible"/>
+                                      </p:to>
+                                    </p:set>
+                                  </p:childTnLst>
+                                </p:cTn>
+                              </p:par>
+                              <p:par>
+                                <p:cTn id="15" presetID="1" presetClass="entr" presetSubtype="0" fill="hold" grpId="0" nodeType="withEffect">
+                                  <p:stCondLst>
+                                    <p:cond delay="0"/>
+                                  </p:stCondLst>
+                                  <p:childTnLst>
+                                    <p:set>
+                                      <p:cBhvr>
+                                        <p:cTn id="16" dur="1" fill="hold">
+                                          <p:stCondLst>
+                                            <p:cond delay="0"/>
+                                          </p:stCondLst>
+                                        </p:cTn>
+                                        <p:tgtEl>
+                                          <p:spTgt spid="3">
+                                            <p:txEl>
+                                              <p:pRg st="4" end="4"/>
+                                            </p:txEl>
+                                          </p:spTgt>
+                                        </p:tgtEl>
+                                        <p:attrNameLst>
+                                          <p:attrName>style.visibility</p:attrName>
+                                        </p:attrNameLst>
+                                      </p:cBhvr>
+                                      <p:to>
+                                        <p:strVal val="visible"/>
+                                      </p:to>
+                                    </p:set>
+                                  </p:childTnLst>
+                                </p:cTn>
+                              </p:par>
+                            </p:childTnLst>
+                          </p:cTn>
+                        </p:par>
+                      </p:childTnLst>
+                    </p:cTn>
+                  </p:par>
+                </p:childTnLst>
+              </p:cTn>
+              <p:prevCondLst>
+                <p:cond evt="onPrev" delay="0">
+                  <p:tgtEl>
+                    <p:sldTgt/>
+                  </p:tgtEl>
+                </p:cond>
+              </p:prevCondLst>
+              <p:nextCondLst>
+                <p:cond evt="onNext" delay="0">
+                  <p:tgtEl>
+                    <p:sldTgt/>
+                  </p:tgtEl>
+                </p:cond>
+              </p:nextCondLst>
+            </p:seq>
+          </p:childTnLst>
+        </p:cTn>
+      </p:par>
+    </p:tnLst>
+    <p:bldLst>
+      <p:bldP spid="3" grpId="0" build="p"/>
+    </p:bldLst>
+  </p:timing>
 </p:sld>
 </file>
 
@@ -6037,53 +8164,6 @@
           </a:p>
         </p:txBody>
       </p:sp>
-      <p:sp>
-        <p:nvSpPr>
-          <p:cNvPr id="3" name="Content Placeholder 2">
-            <a:extLst>
-              <a:ext uri="{FF2B5EF4-FFF2-40B4-BE49-F238E27FC236}">
-                <a16:creationId xmlns:a16="http://schemas.microsoft.com/office/drawing/2014/main" id="{6089C19D-AFA1-371D-F1E7-79A335D51CFF}"/>
-              </a:ext>
-            </a:extLst>
-          </p:cNvPr>
-          <p:cNvSpPr>
-            <a:spLocks noGrp="1"/>
-          </p:cNvSpPr>
-          <p:nvPr>
-            <p:ph idx="1"/>
-          </p:nvPr>
-        </p:nvSpPr>
-        <p:spPr>
-          <a:xfrm>
-            <a:off x="609600" y="1600201"/>
-            <a:ext cx="6471920" cy="4525963"/>
-          </a:xfrm>
-        </p:spPr>
-        <p:txBody>
-          <a:bodyPr/>
-          <a:lstStyle/>
-          <a:p>
-            <a:r>
-              <a:rPr lang="en-US" dirty="0"/>
-              <a:t>Final expression is fairly simple</a:t>
-            </a:r>
-          </a:p>
-          <a:p>
-            <a:pPr lvl="1"/>
-            <a:r>
-              <a:rPr lang="en-US" dirty="0"/>
-              <a:t>Precision: 0.815</a:t>
-            </a:r>
-          </a:p>
-          <a:p>
-            <a:pPr lvl="1"/>
-            <a:r>
-              <a:rPr lang="en-US" dirty="0"/>
-              <a:t>Recall: 0.961</a:t>
-            </a:r>
-          </a:p>
-        </p:txBody>
-      </p:sp>
       <p:pic>
         <p:nvPicPr>
           <p:cNvPr id="6" name="Picture 5">
@@ -6106,8 +8186,180 @@
         </p:blipFill>
         <p:spPr>
           <a:xfrm>
-            <a:off x="752483" y="2965386"/>
+            <a:off x="719353" y="2501772"/>
             <a:ext cx="10448494" cy="927228"/>
+          </a:xfrm>
+          <a:prstGeom prst="rect">
+            <a:avLst/>
+          </a:prstGeom>
+        </p:spPr>
+      </p:pic>
+      <p:sp>
+        <p:nvSpPr>
+          <p:cNvPr id="11" name="TextBox 10">
+            <a:extLst>
+              <a:ext uri="{FF2B5EF4-FFF2-40B4-BE49-F238E27FC236}">
+                <a16:creationId xmlns:a16="http://schemas.microsoft.com/office/drawing/2014/main" id="{FE574E3E-88E3-4558-DD39-E61CFEE25DDA}"/>
+              </a:ext>
+            </a:extLst>
+          </p:cNvPr>
+          <p:cNvSpPr txBox="1"/>
+          <p:nvPr/>
+        </p:nvSpPr>
+        <p:spPr>
+          <a:xfrm>
+            <a:off x="609600" y="1413890"/>
+            <a:ext cx="6783978" cy="707886"/>
+          </a:xfrm>
+          <a:prstGeom prst="rect">
+            <a:avLst/>
+          </a:prstGeom>
+          <a:noFill/>
+        </p:spPr>
+        <p:txBody>
+          <a:bodyPr wrap="square" rtlCol="0">
+            <a:spAutoFit/>
+          </a:bodyPr>
+          <a:lstStyle/>
+          <a:p>
+            <a:pPr algn="l"/>
+            <a:r>
+              <a:rPr lang="en-US" sz="2000" b="1" dirty="0">
+                <a:latin typeface="Arial" panose="020B0604020202020204" pitchFamily="34" charset="0"/>
+                <a:cs typeface="Arial" panose="020B0604020202020204" pitchFamily="34" charset="0"/>
+              </a:rPr>
+              <a:t>Predicting the Cubic Laves phase: </a:t>
+            </a:r>
+          </a:p>
+          <a:p>
+            <a:pPr algn="l"/>
+            <a:r>
+              <a:rPr lang="en-US" sz="2000" dirty="0">
+                <a:latin typeface="Arial" panose="020B0604020202020204" pitchFamily="34" charset="0"/>
+                <a:cs typeface="Arial" panose="020B0604020202020204" pitchFamily="34" charset="0"/>
+              </a:rPr>
+              <a:t>Precision | Recall:   0.82 | 0.96</a:t>
+            </a:r>
+          </a:p>
+        </p:txBody>
+      </p:sp>
+      <p:sp>
+        <p:nvSpPr>
+          <p:cNvPr id="12" name="TextBox 11">
+            <a:extLst>
+              <a:ext uri="{FF2B5EF4-FFF2-40B4-BE49-F238E27FC236}">
+                <a16:creationId xmlns:a16="http://schemas.microsoft.com/office/drawing/2014/main" id="{E75DC839-7FED-D3E1-B301-250C0F0894E0}"/>
+              </a:ext>
+            </a:extLst>
+          </p:cNvPr>
+          <p:cNvSpPr txBox="1"/>
+          <p:nvPr/>
+        </p:nvSpPr>
+        <p:spPr>
+          <a:xfrm>
+            <a:off x="609600" y="4174814"/>
+            <a:ext cx="5373189" cy="707886"/>
+          </a:xfrm>
+          <a:prstGeom prst="rect">
+            <a:avLst/>
+          </a:prstGeom>
+          <a:noFill/>
+        </p:spPr>
+        <p:txBody>
+          <a:bodyPr wrap="square" rtlCol="0">
+            <a:spAutoFit/>
+          </a:bodyPr>
+          <a:lstStyle/>
+          <a:p>
+            <a:pPr algn="l"/>
+            <a:r>
+              <a:rPr lang="en-US" sz="2000" b="1" dirty="0">
+                <a:latin typeface="Arial" panose="020B0604020202020204" pitchFamily="34" charset="0"/>
+                <a:cs typeface="Arial" panose="020B0604020202020204" pitchFamily="34" charset="0"/>
+              </a:rPr>
+              <a:t>Predicting Fluorite</a:t>
+            </a:r>
+          </a:p>
+          <a:p>
+            <a:r>
+              <a:rPr lang="en-US" sz="2000" dirty="0">
+                <a:latin typeface="Arial" panose="020B0604020202020204" pitchFamily="34" charset="0"/>
+                <a:cs typeface="Arial" panose="020B0604020202020204" pitchFamily="34" charset="0"/>
+              </a:rPr>
+              <a:t>Precision | Recall:   0.88 | 0.77</a:t>
+            </a:r>
+          </a:p>
+        </p:txBody>
+      </p:sp>
+      <p:sp>
+        <p:nvSpPr>
+          <p:cNvPr id="13" name="AutoShape 2">
+            <a:extLst>
+              <a:ext uri="{FF2B5EF4-FFF2-40B4-BE49-F238E27FC236}">
+                <a16:creationId xmlns:a16="http://schemas.microsoft.com/office/drawing/2014/main" id="{6FEC9D9C-DDE1-A308-6DFC-22BF853B2894}"/>
+              </a:ext>
+            </a:extLst>
+          </p:cNvPr>
+          <p:cNvSpPr>
+            <a:spLocks noChangeAspect="1" noChangeArrowheads="1"/>
+          </p:cNvSpPr>
+          <p:nvPr/>
+        </p:nvSpPr>
+        <p:spPr bwMode="auto">
+          <a:xfrm>
+            <a:off x="5943600" y="3276600"/>
+            <a:ext cx="304800" cy="304800"/>
+          </a:xfrm>
+          <a:prstGeom prst="rect">
+            <a:avLst/>
+          </a:prstGeom>
+          <a:noFill/>
+          <a:extLst>
+            <a:ext uri="{909E8E84-426E-40DD-AFC4-6F175D3DCCD1}">
+              <a14:hiddenFill xmlns:a14="http://schemas.microsoft.com/office/drawing/2010/main">
+                <a:solidFill>
+                  <a:srgbClr val="FFFFFF"/>
+                </a:solidFill>
+              </a14:hiddenFill>
+            </a:ext>
+          </a:extLst>
+        </p:spPr>
+        <p:txBody>
+          <a:bodyPr vert="horz" wrap="square" lIns="91440" tIns="45720" rIns="91440" bIns="45720" numCol="1" anchor="t" anchorCtr="0" compatLnSpc="1">
+            <a:prstTxWarp prst="textNoShape">
+              <a:avLst/>
+            </a:prstTxWarp>
+          </a:bodyPr>
+          <a:lstStyle/>
+          <a:p>
+            <a:endParaRPr lang="en-US"/>
+          </a:p>
+        </p:txBody>
+      </p:sp>
+      <p:pic>
+        <p:nvPicPr>
+          <p:cNvPr id="4" name="Picture 3">
+            <a:extLst>
+              <a:ext uri="{FF2B5EF4-FFF2-40B4-BE49-F238E27FC236}">
+                <a16:creationId xmlns:a16="http://schemas.microsoft.com/office/drawing/2014/main" id="{9FC4046A-F2FE-5053-E5A8-3DCDED6F2189}"/>
+              </a:ext>
+            </a:extLst>
+          </p:cNvPr>
+          <p:cNvPicPr>
+            <a:picLocks noChangeAspect="1"/>
+          </p:cNvPicPr>
+          <p:nvPr/>
+        </p:nvPicPr>
+        <p:blipFill>
+          <a:blip r:embed="rId3"/>
+          <a:stretch>
+            <a:fillRect/>
+          </a:stretch>
+        </p:blipFill>
+        <p:spPr>
+          <a:xfrm>
+            <a:off x="-152400" y="4882700"/>
+            <a:ext cx="12192000" cy="815513"/>
           </a:xfrm>
           <a:prstGeom prst="rect">
             <a:avLst/>
@@ -6149,7 +8401,7 @@
           <p:cNvPr id="2" name="Title 1">
             <a:extLst>
               <a:ext uri="{FF2B5EF4-FFF2-40B4-BE49-F238E27FC236}">
-                <a16:creationId xmlns:a16="http://schemas.microsoft.com/office/drawing/2014/main" id="{76588E93-4E50-B558-E405-9BADC7C61E45}"/>
+                <a16:creationId xmlns:a16="http://schemas.microsoft.com/office/drawing/2014/main" id="{44EDCF5F-273A-2D63-4EBC-DE8553EF773B}"/>
               </a:ext>
             </a:extLst>
           </p:cNvPr>
@@ -6162,12 +8414,14 @@
         </p:nvSpPr>
         <p:spPr/>
         <p:txBody>
-          <a:bodyPr/>
+          <a:bodyPr>
+            <a:normAutofit fontScale="90000"/>
+          </a:bodyPr>
           <a:lstStyle/>
           <a:p>
             <a:r>
               <a:rPr lang="en-US" dirty="0"/>
-              <a:t>Impact (if successful)</a:t>
+              <a:t>Results – Physical Intuition from Feature Engineering</a:t>
             </a:r>
           </a:p>
         </p:txBody>
@@ -6177,7 +8431,7 @@
           <p:cNvPr id="3" name="Content Placeholder 2">
             <a:extLst>
               <a:ext uri="{FF2B5EF4-FFF2-40B4-BE49-F238E27FC236}">
-                <a16:creationId xmlns:a16="http://schemas.microsoft.com/office/drawing/2014/main" id="{1E61676F-9E12-3A3F-B564-269D72D580FC}"/>
+                <a16:creationId xmlns:a16="http://schemas.microsoft.com/office/drawing/2014/main" id="{6089C19D-AFA1-371D-F1E7-79A335D51CFF}"/>
               </a:ext>
             </a:extLst>
           </p:cNvPr>
@@ -6188,7 +8442,12 @@
             <p:ph idx="1"/>
           </p:nvPr>
         </p:nvSpPr>
-        <p:spPr/>
+        <p:spPr>
+          <a:xfrm>
+            <a:off x="609599" y="1600201"/>
+            <a:ext cx="9074331" cy="4525963"/>
+          </a:xfrm>
+        </p:spPr>
         <p:txBody>
           <a:bodyPr>
             <a:normAutofit/>
@@ -6196,57 +8455,494 @@
           <a:lstStyle/>
           <a:p>
             <a:r>
-              <a:rPr lang="en-US" sz="2800" dirty="0"/>
-              <a:t>Formulate a data-driven tolerance factor:</a:t>
+              <a:rPr lang="en-US" dirty="0"/>
+              <a:t>Symbolic learner was not well-tuned</a:t>
+            </a:r>
+          </a:p>
+          <a:p>
+            <a:r>
+              <a:rPr lang="en-US" dirty="0" err="1"/>
+              <a:t>RandomForest</a:t>
+            </a:r>
+            <a:r>
+              <a:rPr lang="en-US" dirty="0"/>
+              <a:t> </a:t>
+            </a:r>
+            <a:r>
+              <a:rPr lang="en-US" dirty="0" err="1"/>
+              <a:t>feature_importances</a:t>
+            </a:r>
+            <a:r>
+              <a:rPr lang="en-US" dirty="0"/>
+              <a:t> confirm chemical intuition</a:t>
+            </a:r>
+          </a:p>
+          <a:p>
+            <a:r>
+              <a:rPr lang="en-US" i="1" dirty="0"/>
+              <a:t>Laves phase</a:t>
             </a:r>
           </a:p>
           <a:p>
             <a:pPr lvl="1"/>
             <a:r>
-              <a:rPr lang="en-US" sz="2800" dirty="0"/>
-              <a:t>using a repeatable workflow</a:t>
+              <a:rPr lang="en-US" dirty="0"/>
+              <a:t>Most important feature: (# p electrons/# unfilled valence states) </a:t>
             </a:r>
           </a:p>
           <a:p>
             <a:pPr lvl="1"/>
             <a:r>
-              <a:rPr lang="en-US" sz="2800" dirty="0"/>
-              <a:t>that is simple to use and interpretable</a:t>
-            </a:r>
-          </a:p>
-          <a:p>
-            <a:r>
-              <a:rPr lang="en-US" sz="2800" dirty="0"/>
-              <a:t>Identify new features important for prototype classification</a:t>
-            </a:r>
-          </a:p>
-          <a:p>
-            <a:r>
-              <a:rPr lang="en-US" sz="2800" dirty="0"/>
-              <a:t>Create design rules for novel materials discovery</a:t>
-            </a:r>
-          </a:p>
-          <a:p>
-            <a:endParaRPr lang="en-US" sz="2800" dirty="0"/>
-          </a:p>
-          <a:p>
-            <a:pPr marL="0" indent="0">
+              <a:rPr lang="en-US" dirty="0"/>
+              <a:t>Precision | Recall:	  0.82 | 0.93</a:t>
+            </a:r>
+          </a:p>
+          <a:p>
+            <a:r>
+              <a:rPr lang="en-US" i="1" dirty="0"/>
+              <a:t>Fluorite</a:t>
+            </a:r>
+          </a:p>
+          <a:p>
+            <a:pPr lvl="1"/>
+            <a:r>
+              <a:rPr lang="en-US" dirty="0"/>
+              <a:t>Most important feature: Radius ratio</a:t>
+            </a:r>
+          </a:p>
+          <a:p>
+            <a:pPr lvl="1"/>
+            <a:r>
+              <a:rPr lang="en-US" dirty="0"/>
+              <a:t>Precision | Recall:	  0.90 | 0.96</a:t>
+            </a:r>
+          </a:p>
+          <a:p>
+            <a:pPr marL="609585" lvl="1" indent="0">
               <a:buNone/>
             </a:pPr>
-            <a:endParaRPr lang="en-US" sz="2800" dirty="0"/>
+            <a:endParaRPr lang="en-US" dirty="0"/>
+          </a:p>
+          <a:p>
+            <a:r>
+              <a:rPr lang="en-US" dirty="0"/>
+              <a:t>We expect a well-tuned symbolic learner to achieve these accuracies</a:t>
+            </a:r>
           </a:p>
         </p:txBody>
       </p:sp>
     </p:spTree>
     <p:extLst>
       <p:ext uri="{BB962C8B-B14F-4D97-AF65-F5344CB8AC3E}">
-        <p14:creationId xmlns:p14="http://schemas.microsoft.com/office/powerpoint/2010/main" val="717126368"/>
+        <p14:creationId xmlns:p14="http://schemas.microsoft.com/office/powerpoint/2010/main" val="2448306971"/>
       </p:ext>
     </p:extLst>
   </p:cSld>
   <p:clrMapOvr>
     <a:masterClrMapping/>
   </p:clrMapOvr>
+  <p:timing>
+    <p:tnLst>
+      <p:par>
+        <p:cTn id="1" dur="indefinite" restart="never" nodeType="tmRoot">
+          <p:childTnLst>
+            <p:seq concurrent="1" nextAc="seek">
+              <p:cTn id="2" dur="indefinite" nodeType="mainSeq">
+                <p:childTnLst>
+                  <p:par>
+                    <p:cTn id="3" fill="hold">
+                      <p:stCondLst>
+                        <p:cond delay="indefinite"/>
+                      </p:stCondLst>
+                      <p:childTnLst>
+                        <p:par>
+                          <p:cTn id="4" fill="hold">
+                            <p:stCondLst>
+                              <p:cond delay="0"/>
+                            </p:stCondLst>
+                            <p:childTnLst>
+                              <p:par>
+                                <p:cTn id="5" presetID="1" presetClass="entr" presetSubtype="0" fill="hold" grpId="0" nodeType="clickEffect">
+                                  <p:stCondLst>
+                                    <p:cond delay="0"/>
+                                  </p:stCondLst>
+                                  <p:childTnLst>
+                                    <p:set>
+                                      <p:cBhvr>
+                                        <p:cTn id="6" dur="1" fill="hold">
+                                          <p:stCondLst>
+                                            <p:cond delay="0"/>
+                                          </p:stCondLst>
+                                        </p:cTn>
+                                        <p:tgtEl>
+                                          <p:spTgt spid="3">
+                                            <p:txEl>
+                                              <p:pRg st="0" end="0"/>
+                                            </p:txEl>
+                                          </p:spTgt>
+                                        </p:tgtEl>
+                                        <p:attrNameLst>
+                                          <p:attrName>style.visibility</p:attrName>
+                                        </p:attrNameLst>
+                                      </p:cBhvr>
+                                      <p:to>
+                                        <p:strVal val="visible"/>
+                                      </p:to>
+                                    </p:set>
+                                  </p:childTnLst>
+                                </p:cTn>
+                              </p:par>
+                            </p:childTnLst>
+                          </p:cTn>
+                        </p:par>
+                      </p:childTnLst>
+                    </p:cTn>
+                  </p:par>
+                  <p:par>
+                    <p:cTn id="7" fill="hold">
+                      <p:stCondLst>
+                        <p:cond delay="indefinite"/>
+                      </p:stCondLst>
+                      <p:childTnLst>
+                        <p:par>
+                          <p:cTn id="8" fill="hold">
+                            <p:stCondLst>
+                              <p:cond delay="0"/>
+                            </p:stCondLst>
+                            <p:childTnLst>
+                              <p:par>
+                                <p:cTn id="9" presetID="1" presetClass="entr" presetSubtype="0" fill="hold" grpId="0" nodeType="clickEffect">
+                                  <p:stCondLst>
+                                    <p:cond delay="0"/>
+                                  </p:stCondLst>
+                                  <p:childTnLst>
+                                    <p:set>
+                                      <p:cBhvr>
+                                        <p:cTn id="10" dur="1" fill="hold">
+                                          <p:stCondLst>
+                                            <p:cond delay="0"/>
+                                          </p:stCondLst>
+                                        </p:cTn>
+                                        <p:tgtEl>
+                                          <p:spTgt spid="3">
+                                            <p:txEl>
+                                              <p:pRg st="1" end="1"/>
+                                            </p:txEl>
+                                          </p:spTgt>
+                                        </p:tgtEl>
+                                        <p:attrNameLst>
+                                          <p:attrName>style.visibility</p:attrName>
+                                        </p:attrNameLst>
+                                      </p:cBhvr>
+                                      <p:to>
+                                        <p:strVal val="visible"/>
+                                      </p:to>
+                                    </p:set>
+                                  </p:childTnLst>
+                                </p:cTn>
+                              </p:par>
+                            </p:childTnLst>
+                          </p:cTn>
+                        </p:par>
+                      </p:childTnLst>
+                    </p:cTn>
+                  </p:par>
+                  <p:par>
+                    <p:cTn id="11" fill="hold">
+                      <p:stCondLst>
+                        <p:cond delay="indefinite"/>
+                      </p:stCondLst>
+                      <p:childTnLst>
+                        <p:par>
+                          <p:cTn id="12" fill="hold">
+                            <p:stCondLst>
+                              <p:cond delay="0"/>
+                            </p:stCondLst>
+                            <p:childTnLst>
+                              <p:par>
+                                <p:cTn id="13" presetID="1" presetClass="entr" presetSubtype="0" fill="hold" grpId="0" nodeType="clickEffect">
+                                  <p:stCondLst>
+                                    <p:cond delay="0"/>
+                                  </p:stCondLst>
+                                  <p:childTnLst>
+                                    <p:set>
+                                      <p:cBhvr>
+                                        <p:cTn id="14" dur="1" fill="hold">
+                                          <p:stCondLst>
+                                            <p:cond delay="0"/>
+                                          </p:stCondLst>
+                                        </p:cTn>
+                                        <p:tgtEl>
+                                          <p:spTgt spid="3">
+                                            <p:txEl>
+                                              <p:pRg st="2" end="2"/>
+                                            </p:txEl>
+                                          </p:spTgt>
+                                        </p:tgtEl>
+                                        <p:attrNameLst>
+                                          <p:attrName>style.visibility</p:attrName>
+                                        </p:attrNameLst>
+                                      </p:cBhvr>
+                                      <p:to>
+                                        <p:strVal val="visible"/>
+                                      </p:to>
+                                    </p:set>
+                                  </p:childTnLst>
+                                </p:cTn>
+                              </p:par>
+                              <p:par>
+                                <p:cTn id="15" presetID="1" presetClass="entr" presetSubtype="0" fill="hold" grpId="0" nodeType="withEffect">
+                                  <p:stCondLst>
+                                    <p:cond delay="0"/>
+                                  </p:stCondLst>
+                                  <p:childTnLst>
+                                    <p:set>
+                                      <p:cBhvr>
+                                        <p:cTn id="16" dur="1" fill="hold">
+                                          <p:stCondLst>
+                                            <p:cond delay="0"/>
+                                          </p:stCondLst>
+                                        </p:cTn>
+                                        <p:tgtEl>
+                                          <p:spTgt spid="3">
+                                            <p:txEl>
+                                              <p:pRg st="3" end="3"/>
+                                            </p:txEl>
+                                          </p:spTgt>
+                                        </p:tgtEl>
+                                        <p:attrNameLst>
+                                          <p:attrName>style.visibility</p:attrName>
+                                        </p:attrNameLst>
+                                      </p:cBhvr>
+                                      <p:to>
+                                        <p:strVal val="visible"/>
+                                      </p:to>
+                                    </p:set>
+                                  </p:childTnLst>
+                                </p:cTn>
+                              </p:par>
+                              <p:par>
+                                <p:cTn id="17" presetID="1" presetClass="entr" presetSubtype="0" fill="hold" grpId="0" nodeType="withEffect">
+                                  <p:stCondLst>
+                                    <p:cond delay="0"/>
+                                  </p:stCondLst>
+                                  <p:childTnLst>
+                                    <p:set>
+                                      <p:cBhvr>
+                                        <p:cTn id="18" dur="1" fill="hold">
+                                          <p:stCondLst>
+                                            <p:cond delay="0"/>
+                                          </p:stCondLst>
+                                        </p:cTn>
+                                        <p:tgtEl>
+                                          <p:spTgt spid="3">
+                                            <p:txEl>
+                                              <p:pRg st="4" end="4"/>
+                                            </p:txEl>
+                                          </p:spTgt>
+                                        </p:tgtEl>
+                                        <p:attrNameLst>
+                                          <p:attrName>style.visibility</p:attrName>
+                                        </p:attrNameLst>
+                                      </p:cBhvr>
+                                      <p:to>
+                                        <p:strVal val="visible"/>
+                                      </p:to>
+                                    </p:set>
+                                  </p:childTnLst>
+                                </p:cTn>
+                              </p:par>
+                            </p:childTnLst>
+                          </p:cTn>
+                        </p:par>
+                      </p:childTnLst>
+                    </p:cTn>
+                  </p:par>
+                  <p:par>
+                    <p:cTn id="19" fill="hold">
+                      <p:stCondLst>
+                        <p:cond delay="indefinite"/>
+                      </p:stCondLst>
+                      <p:childTnLst>
+                        <p:par>
+                          <p:cTn id="20" fill="hold">
+                            <p:stCondLst>
+                              <p:cond delay="0"/>
+                            </p:stCondLst>
+                            <p:childTnLst>
+                              <p:par>
+                                <p:cTn id="21" presetID="1" presetClass="entr" presetSubtype="0" fill="hold" grpId="0" nodeType="clickEffect">
+                                  <p:stCondLst>
+                                    <p:cond delay="0"/>
+                                  </p:stCondLst>
+                                  <p:childTnLst>
+                                    <p:set>
+                                      <p:cBhvr>
+                                        <p:cTn id="22" dur="1" fill="hold">
+                                          <p:stCondLst>
+                                            <p:cond delay="0"/>
+                                          </p:stCondLst>
+                                        </p:cTn>
+                                        <p:tgtEl>
+                                          <p:spTgt spid="3">
+                                            <p:txEl>
+                                              <p:pRg st="5" end="5"/>
+                                            </p:txEl>
+                                          </p:spTgt>
+                                        </p:tgtEl>
+                                        <p:attrNameLst>
+                                          <p:attrName>style.visibility</p:attrName>
+                                        </p:attrNameLst>
+                                      </p:cBhvr>
+                                      <p:to>
+                                        <p:strVal val="visible"/>
+                                      </p:to>
+                                    </p:set>
+                                  </p:childTnLst>
+                                </p:cTn>
+                              </p:par>
+                              <p:par>
+                                <p:cTn id="23" presetID="1" presetClass="entr" presetSubtype="0" fill="hold" grpId="0" nodeType="withEffect">
+                                  <p:stCondLst>
+                                    <p:cond delay="0"/>
+                                  </p:stCondLst>
+                                  <p:childTnLst>
+                                    <p:set>
+                                      <p:cBhvr>
+                                        <p:cTn id="24" dur="1" fill="hold">
+                                          <p:stCondLst>
+                                            <p:cond delay="0"/>
+                                          </p:stCondLst>
+                                        </p:cTn>
+                                        <p:tgtEl>
+                                          <p:spTgt spid="3">
+                                            <p:txEl>
+                                              <p:pRg st="6" end="6"/>
+                                            </p:txEl>
+                                          </p:spTgt>
+                                        </p:tgtEl>
+                                        <p:attrNameLst>
+                                          <p:attrName>style.visibility</p:attrName>
+                                        </p:attrNameLst>
+                                      </p:cBhvr>
+                                      <p:to>
+                                        <p:strVal val="visible"/>
+                                      </p:to>
+                                    </p:set>
+                                  </p:childTnLst>
+                                </p:cTn>
+                              </p:par>
+                              <p:par>
+                                <p:cTn id="25" presetID="1" presetClass="entr" presetSubtype="0" fill="hold" grpId="0" nodeType="withEffect">
+                                  <p:stCondLst>
+                                    <p:cond delay="0"/>
+                                  </p:stCondLst>
+                                  <p:childTnLst>
+                                    <p:set>
+                                      <p:cBhvr>
+                                        <p:cTn id="26" dur="1" fill="hold">
+                                          <p:stCondLst>
+                                            <p:cond delay="0"/>
+                                          </p:stCondLst>
+                                        </p:cTn>
+                                        <p:tgtEl>
+                                          <p:spTgt spid="3">
+                                            <p:txEl>
+                                              <p:pRg st="7" end="7"/>
+                                            </p:txEl>
+                                          </p:spTgt>
+                                        </p:tgtEl>
+                                        <p:attrNameLst>
+                                          <p:attrName>style.visibility</p:attrName>
+                                        </p:attrNameLst>
+                                      </p:cBhvr>
+                                      <p:to>
+                                        <p:strVal val="visible"/>
+                                      </p:to>
+                                    </p:set>
+                                  </p:childTnLst>
+                                </p:cTn>
+                              </p:par>
+                            </p:childTnLst>
+                          </p:cTn>
+                        </p:par>
+                      </p:childTnLst>
+                    </p:cTn>
+                  </p:par>
+                  <p:par>
+                    <p:cTn id="27" fill="hold">
+                      <p:stCondLst>
+                        <p:cond delay="indefinite"/>
+                      </p:stCondLst>
+                      <p:childTnLst>
+                        <p:par>
+                          <p:cTn id="28" fill="hold">
+                            <p:stCondLst>
+                              <p:cond delay="0"/>
+                            </p:stCondLst>
+                            <p:childTnLst>
+                              <p:par>
+                                <p:cTn id="29" presetID="1" presetClass="entr" presetSubtype="0" fill="hold" grpId="0" nodeType="clickEffect">
+                                  <p:stCondLst>
+                                    <p:cond delay="0"/>
+                                  </p:stCondLst>
+                                  <p:childTnLst>
+                                    <p:set>
+                                      <p:cBhvr>
+                                        <p:cTn id="30" dur="1" fill="hold">
+                                          <p:stCondLst>
+                                            <p:cond delay="0"/>
+                                          </p:stCondLst>
+                                        </p:cTn>
+                                        <p:tgtEl>
+                                          <p:spTgt spid="3">
+                                            <p:txEl>
+                                              <p:pRg st="9" end="9"/>
+                                            </p:txEl>
+                                          </p:spTgt>
+                                        </p:tgtEl>
+                                        <p:attrNameLst>
+                                          <p:attrName>style.visibility</p:attrName>
+                                        </p:attrNameLst>
+                                      </p:cBhvr>
+                                      <p:to>
+                                        <p:strVal val="visible"/>
+                                      </p:to>
+                                    </p:set>
+                                  </p:childTnLst>
+                                </p:cTn>
+                              </p:par>
+                            </p:childTnLst>
+                          </p:cTn>
+                        </p:par>
+                      </p:childTnLst>
+                    </p:cTn>
+                  </p:par>
+                </p:childTnLst>
+              </p:cTn>
+              <p:prevCondLst>
+                <p:cond evt="onPrev" delay="0">
+                  <p:tgtEl>
+                    <p:sldTgt/>
+                  </p:tgtEl>
+                </p:cond>
+              </p:prevCondLst>
+              <p:nextCondLst>
+                <p:cond evt="onNext" delay="0">
+                  <p:tgtEl>
+                    <p:sldTgt/>
+                  </p:tgtEl>
+                </p:cond>
+              </p:nextCondLst>
+            </p:seq>
+          </p:childTnLst>
+        </p:cTn>
+      </p:par>
+    </p:tnLst>
+    <p:bldLst>
+      <p:bldP spid="3" grpId="0" build="p"/>
+    </p:bldLst>
+  </p:timing>
 </p:sld>
 </file>
 

</xml_diff>